<commit_message>
Tambahan perbaikan modul 1
</commit_message>
<xml_diff>
--- a/slides/1 - Pengantar dan Model Matematika Big O.pptx
+++ b/slides/1 - Pengantar dan Model Matematika Big O.pptx
@@ -4,6 +4,9 @@
   <p:sldMasterIdLst>
     <p:sldMasterId id="2147483660" r:id="rId1"/>
   </p:sldMasterIdLst>
+  <p:notesMasterIdLst>
+    <p:notesMasterId r:id="rId29"/>
+  </p:notesMasterIdLst>
   <p:sldIdLst>
     <p:sldId id="256" r:id="rId2"/>
     <p:sldId id="276" r:id="rId3"/>
@@ -132,10 +135,1659 @@
   </p:defaultTextStyle>
   <p:extLst>
     <p:ext uri="{EFAFB233-063F-42B5-8137-9DF3F51BA10A}">
-      <p15:sldGuideLst xmlns:p15="http://schemas.microsoft.com/office/powerpoint/2012/main"/>
+      <p15:sldGuideLst xmlns:p15="http://schemas.microsoft.com/office/powerpoint/2012/main" xmlns=""/>
     </p:ext>
   </p:extLst>
 </p:presentation>
+</file>
+
+<file path=ppt/notesMasters/notesMaster1.xml><?xml version="1.0" encoding="utf-8"?>
+<p:notesMaster xmlns:a="http://schemas.openxmlformats.org/drawingml/2006/main" xmlns:r="http://schemas.openxmlformats.org/officeDocument/2006/relationships" xmlns:p="http://schemas.openxmlformats.org/presentationml/2006/main">
+  <p:cSld>
+    <p:bg>
+      <p:bgRef idx="1001">
+        <a:schemeClr val="bg1"/>
+      </p:bgRef>
+    </p:bg>
+    <p:spTree>
+      <p:nvGrpSpPr>
+        <p:cNvPr id="1" name=""/>
+        <p:cNvGrpSpPr/>
+        <p:nvPr/>
+      </p:nvGrpSpPr>
+      <p:grpSpPr>
+        <a:xfrm>
+          <a:off x="0" y="0"/>
+          <a:ext cx="0" cy="0"/>
+          <a:chOff x="0" y="0"/>
+          <a:chExt cx="0" cy="0"/>
+        </a:xfrm>
+      </p:grpSpPr>
+      <p:sp>
+        <p:nvSpPr>
+          <p:cNvPr id="2" name="Header Placeholder 1"/>
+          <p:cNvSpPr>
+            <a:spLocks noGrp="1"/>
+          </p:cNvSpPr>
+          <p:nvPr>
+            <p:ph type="hdr" sz="quarter"/>
+          </p:nvPr>
+        </p:nvSpPr>
+        <p:spPr>
+          <a:xfrm>
+            <a:off x="0" y="0"/>
+            <a:ext cx="2971800" cy="457200"/>
+          </a:xfrm>
+          <a:prstGeom prst="rect">
+            <a:avLst/>
+          </a:prstGeom>
+        </p:spPr>
+        <p:txBody>
+          <a:bodyPr vert="horz" lIns="91440" tIns="45720" rIns="91440" bIns="45720" rtlCol="0"/>
+          <a:lstStyle>
+            <a:lvl1pPr algn="l">
+              <a:defRPr sz="1200"/>
+            </a:lvl1pPr>
+          </a:lstStyle>
+          <a:p>
+            <a:endParaRPr lang="en-US"/>
+          </a:p>
+        </p:txBody>
+      </p:sp>
+      <p:sp>
+        <p:nvSpPr>
+          <p:cNvPr id="3" name="Date Placeholder 2"/>
+          <p:cNvSpPr>
+            <a:spLocks noGrp="1"/>
+          </p:cNvSpPr>
+          <p:nvPr>
+            <p:ph type="dt" idx="1"/>
+          </p:nvPr>
+        </p:nvSpPr>
+        <p:spPr>
+          <a:xfrm>
+            <a:off x="3884613" y="0"/>
+            <a:ext cx="2971800" cy="457200"/>
+          </a:xfrm>
+          <a:prstGeom prst="rect">
+            <a:avLst/>
+          </a:prstGeom>
+        </p:spPr>
+        <p:txBody>
+          <a:bodyPr vert="horz" lIns="91440" tIns="45720" rIns="91440" bIns="45720" rtlCol="0"/>
+          <a:lstStyle>
+            <a:lvl1pPr algn="r">
+              <a:defRPr sz="1200"/>
+            </a:lvl1pPr>
+          </a:lstStyle>
+          <a:p>
+            <a:fld id="{EF7BE34A-8FD5-4222-BD48-A6274F557804}" type="datetimeFigureOut">
+              <a:rPr lang="en-US" smtClean="0"/>
+              <a:t>16-Sep-14</a:t>
+            </a:fld>
+            <a:endParaRPr lang="en-US"/>
+          </a:p>
+        </p:txBody>
+      </p:sp>
+      <p:sp>
+        <p:nvSpPr>
+          <p:cNvPr id="4" name="Slide Image Placeholder 3"/>
+          <p:cNvSpPr>
+            <a:spLocks noGrp="1" noRot="1" noChangeAspect="1"/>
+          </p:cNvSpPr>
+          <p:nvPr>
+            <p:ph type="sldImg" idx="2"/>
+          </p:nvPr>
+        </p:nvSpPr>
+        <p:spPr>
+          <a:xfrm>
+            <a:off x="1143000" y="685800"/>
+            <a:ext cx="4572000" cy="3429000"/>
+          </a:xfrm>
+          <a:prstGeom prst="rect">
+            <a:avLst/>
+          </a:prstGeom>
+          <a:noFill/>
+          <a:ln w="12700">
+            <a:solidFill>
+              <a:prstClr val="black"/>
+            </a:solidFill>
+          </a:ln>
+        </p:spPr>
+        <p:txBody>
+          <a:bodyPr vert="horz" lIns="91440" tIns="45720" rIns="91440" bIns="45720" rtlCol="0" anchor="ctr"/>
+          <a:lstStyle/>
+          <a:p>
+            <a:endParaRPr lang="en-US"/>
+          </a:p>
+        </p:txBody>
+      </p:sp>
+      <p:sp>
+        <p:nvSpPr>
+          <p:cNvPr id="5" name="Notes Placeholder 4"/>
+          <p:cNvSpPr>
+            <a:spLocks noGrp="1"/>
+          </p:cNvSpPr>
+          <p:nvPr>
+            <p:ph type="body" sz="quarter" idx="3"/>
+          </p:nvPr>
+        </p:nvSpPr>
+        <p:spPr>
+          <a:xfrm>
+            <a:off x="685800" y="4343400"/>
+            <a:ext cx="5486400" cy="4114800"/>
+          </a:xfrm>
+          <a:prstGeom prst="rect">
+            <a:avLst/>
+          </a:prstGeom>
+        </p:spPr>
+        <p:txBody>
+          <a:bodyPr vert="horz" lIns="91440" tIns="45720" rIns="91440" bIns="45720" rtlCol="0"/>
+          <a:lstStyle/>
+          <a:p>
+            <a:pPr lvl="0"/>
+            <a:r>
+              <a:rPr lang="en-US" smtClean="0"/>
+              <a:t>Click to edit Master text styles</a:t>
+            </a:r>
+          </a:p>
+          <a:p>
+            <a:pPr lvl="1"/>
+            <a:r>
+              <a:rPr lang="en-US" smtClean="0"/>
+              <a:t>Second level</a:t>
+            </a:r>
+          </a:p>
+          <a:p>
+            <a:pPr lvl="2"/>
+            <a:r>
+              <a:rPr lang="en-US" smtClean="0"/>
+              <a:t>Third level</a:t>
+            </a:r>
+          </a:p>
+          <a:p>
+            <a:pPr lvl="3"/>
+            <a:r>
+              <a:rPr lang="en-US" smtClean="0"/>
+              <a:t>Fourth level</a:t>
+            </a:r>
+          </a:p>
+          <a:p>
+            <a:pPr lvl="4"/>
+            <a:r>
+              <a:rPr lang="en-US" smtClean="0"/>
+              <a:t>Fifth level</a:t>
+            </a:r>
+            <a:endParaRPr lang="en-US"/>
+          </a:p>
+        </p:txBody>
+      </p:sp>
+      <p:sp>
+        <p:nvSpPr>
+          <p:cNvPr id="6" name="Footer Placeholder 5"/>
+          <p:cNvSpPr>
+            <a:spLocks noGrp="1"/>
+          </p:cNvSpPr>
+          <p:nvPr>
+            <p:ph type="ftr" sz="quarter" idx="4"/>
+          </p:nvPr>
+        </p:nvSpPr>
+        <p:spPr>
+          <a:xfrm>
+            <a:off x="0" y="8685213"/>
+            <a:ext cx="2971800" cy="457200"/>
+          </a:xfrm>
+          <a:prstGeom prst="rect">
+            <a:avLst/>
+          </a:prstGeom>
+        </p:spPr>
+        <p:txBody>
+          <a:bodyPr vert="horz" lIns="91440" tIns="45720" rIns="91440" bIns="45720" rtlCol="0" anchor="b"/>
+          <a:lstStyle>
+            <a:lvl1pPr algn="l">
+              <a:defRPr sz="1200"/>
+            </a:lvl1pPr>
+          </a:lstStyle>
+          <a:p>
+            <a:endParaRPr lang="en-US"/>
+          </a:p>
+        </p:txBody>
+      </p:sp>
+      <p:sp>
+        <p:nvSpPr>
+          <p:cNvPr id="7" name="Slide Number Placeholder 6"/>
+          <p:cNvSpPr>
+            <a:spLocks noGrp="1"/>
+          </p:cNvSpPr>
+          <p:nvPr>
+            <p:ph type="sldNum" sz="quarter" idx="5"/>
+          </p:nvPr>
+        </p:nvSpPr>
+        <p:spPr>
+          <a:xfrm>
+            <a:off x="3884613" y="8685213"/>
+            <a:ext cx="2971800" cy="457200"/>
+          </a:xfrm>
+          <a:prstGeom prst="rect">
+            <a:avLst/>
+          </a:prstGeom>
+        </p:spPr>
+        <p:txBody>
+          <a:bodyPr vert="horz" lIns="91440" tIns="45720" rIns="91440" bIns="45720" rtlCol="0" anchor="b"/>
+          <a:lstStyle>
+            <a:lvl1pPr algn="r">
+              <a:defRPr sz="1200"/>
+            </a:lvl1pPr>
+          </a:lstStyle>
+          <a:p>
+            <a:fld id="{2F19F918-7AB5-42C2-AED8-408C377E077E}" type="slidenum">
+              <a:rPr lang="en-US" smtClean="0"/>
+              <a:t>‹#›</a:t>
+            </a:fld>
+            <a:endParaRPr lang="en-US"/>
+          </a:p>
+        </p:txBody>
+      </p:sp>
+    </p:spTree>
+    <p:extLst>
+      <p:ext uri="{BB962C8B-B14F-4D97-AF65-F5344CB8AC3E}">
+        <p14:creationId xmlns:p14="http://schemas.microsoft.com/office/powerpoint/2010/main" val="1235925091"/>
+      </p:ext>
+    </p:extLst>
+  </p:cSld>
+  <p:clrMap bg1="lt1" tx1="dk1" bg2="lt2" tx2="dk2" accent1="accent1" accent2="accent2" accent3="accent3" accent4="accent4" accent5="accent5" accent6="accent6" hlink="hlink" folHlink="folHlink"/>
+  <p:notesStyle>
+    <a:lvl1pPr marL="0" algn="l" defTabSz="914400" rtl="0" eaLnBrk="1" latinLnBrk="0" hangingPunct="1">
+      <a:defRPr sz="1200" kern="1200">
+        <a:solidFill>
+          <a:schemeClr val="tx1"/>
+        </a:solidFill>
+        <a:latin typeface="+mn-lt"/>
+        <a:ea typeface="+mn-ea"/>
+        <a:cs typeface="+mn-cs"/>
+      </a:defRPr>
+    </a:lvl1pPr>
+    <a:lvl2pPr marL="457200" algn="l" defTabSz="914400" rtl="0" eaLnBrk="1" latinLnBrk="0" hangingPunct="1">
+      <a:defRPr sz="1200" kern="1200">
+        <a:solidFill>
+          <a:schemeClr val="tx1"/>
+        </a:solidFill>
+        <a:latin typeface="+mn-lt"/>
+        <a:ea typeface="+mn-ea"/>
+        <a:cs typeface="+mn-cs"/>
+      </a:defRPr>
+    </a:lvl2pPr>
+    <a:lvl3pPr marL="914400" algn="l" defTabSz="914400" rtl="0" eaLnBrk="1" latinLnBrk="0" hangingPunct="1">
+      <a:defRPr sz="1200" kern="1200">
+        <a:solidFill>
+          <a:schemeClr val="tx1"/>
+        </a:solidFill>
+        <a:latin typeface="+mn-lt"/>
+        <a:ea typeface="+mn-ea"/>
+        <a:cs typeface="+mn-cs"/>
+      </a:defRPr>
+    </a:lvl3pPr>
+    <a:lvl4pPr marL="1371600" algn="l" defTabSz="914400" rtl="0" eaLnBrk="1" latinLnBrk="0" hangingPunct="1">
+      <a:defRPr sz="1200" kern="1200">
+        <a:solidFill>
+          <a:schemeClr val="tx1"/>
+        </a:solidFill>
+        <a:latin typeface="+mn-lt"/>
+        <a:ea typeface="+mn-ea"/>
+        <a:cs typeface="+mn-cs"/>
+      </a:defRPr>
+    </a:lvl4pPr>
+    <a:lvl5pPr marL="1828800" algn="l" defTabSz="914400" rtl="0" eaLnBrk="1" latinLnBrk="0" hangingPunct="1">
+      <a:defRPr sz="1200" kern="1200">
+        <a:solidFill>
+          <a:schemeClr val="tx1"/>
+        </a:solidFill>
+        <a:latin typeface="+mn-lt"/>
+        <a:ea typeface="+mn-ea"/>
+        <a:cs typeface="+mn-cs"/>
+      </a:defRPr>
+    </a:lvl5pPr>
+    <a:lvl6pPr marL="2286000" algn="l" defTabSz="914400" rtl="0" eaLnBrk="1" latinLnBrk="0" hangingPunct="1">
+      <a:defRPr sz="1200" kern="1200">
+        <a:solidFill>
+          <a:schemeClr val="tx1"/>
+        </a:solidFill>
+        <a:latin typeface="+mn-lt"/>
+        <a:ea typeface="+mn-ea"/>
+        <a:cs typeface="+mn-cs"/>
+      </a:defRPr>
+    </a:lvl6pPr>
+    <a:lvl7pPr marL="2743200" algn="l" defTabSz="914400" rtl="0" eaLnBrk="1" latinLnBrk="0" hangingPunct="1">
+      <a:defRPr sz="1200" kern="1200">
+        <a:solidFill>
+          <a:schemeClr val="tx1"/>
+        </a:solidFill>
+        <a:latin typeface="+mn-lt"/>
+        <a:ea typeface="+mn-ea"/>
+        <a:cs typeface="+mn-cs"/>
+      </a:defRPr>
+    </a:lvl7pPr>
+    <a:lvl8pPr marL="3200400" algn="l" defTabSz="914400" rtl="0" eaLnBrk="1" latinLnBrk="0" hangingPunct="1">
+      <a:defRPr sz="1200" kern="1200">
+        <a:solidFill>
+          <a:schemeClr val="tx1"/>
+        </a:solidFill>
+        <a:latin typeface="+mn-lt"/>
+        <a:ea typeface="+mn-ea"/>
+        <a:cs typeface="+mn-cs"/>
+      </a:defRPr>
+    </a:lvl8pPr>
+    <a:lvl9pPr marL="3657600" algn="l" defTabSz="914400" rtl="0" eaLnBrk="1" latinLnBrk="0" hangingPunct="1">
+      <a:defRPr sz="1200" kern="1200">
+        <a:solidFill>
+          <a:schemeClr val="tx1"/>
+        </a:solidFill>
+        <a:latin typeface="+mn-lt"/>
+        <a:ea typeface="+mn-ea"/>
+        <a:cs typeface="+mn-cs"/>
+      </a:defRPr>
+    </a:lvl9pPr>
+  </p:notesStyle>
+</p:notesMaster>
+</file>
+
+<file path=ppt/notesSlides/notesSlide1.xml><?xml version="1.0" encoding="utf-8"?>
+<p:notes xmlns:a="http://schemas.openxmlformats.org/drawingml/2006/main" xmlns:r="http://schemas.openxmlformats.org/officeDocument/2006/relationships" xmlns:p="http://schemas.openxmlformats.org/presentationml/2006/main">
+  <p:cSld>
+    <p:spTree>
+      <p:nvGrpSpPr>
+        <p:cNvPr id="1" name=""/>
+        <p:cNvGrpSpPr/>
+        <p:nvPr/>
+      </p:nvGrpSpPr>
+      <p:grpSpPr>
+        <a:xfrm>
+          <a:off x="0" y="0"/>
+          <a:ext cx="0" cy="0"/>
+          <a:chOff x="0" y="0"/>
+          <a:chExt cx="0" cy="0"/>
+        </a:xfrm>
+      </p:grpSpPr>
+      <p:sp>
+        <p:nvSpPr>
+          <p:cNvPr id="2" name="Slide Image Placeholder 1"/>
+          <p:cNvSpPr>
+            <a:spLocks noGrp="1" noRot="1" noChangeAspect="1"/>
+          </p:cNvSpPr>
+          <p:nvPr>
+            <p:ph type="sldImg"/>
+          </p:nvPr>
+        </p:nvSpPr>
+        <p:spPr/>
+      </p:sp>
+      <p:sp>
+        <p:nvSpPr>
+          <p:cNvPr id="3" name="Notes Placeholder 2"/>
+          <p:cNvSpPr>
+            <a:spLocks noGrp="1"/>
+          </p:cNvSpPr>
+          <p:nvPr>
+            <p:ph type="body" idx="1"/>
+          </p:nvPr>
+        </p:nvSpPr>
+        <p:spPr/>
+        <p:txBody>
+          <a:bodyPr/>
+          <a:lstStyle/>
+          <a:p>
+            <a:r>
+              <a:rPr lang="en-US" sz="1200" b="0" i="0" u="none" strike="noStrike" kern="1200" baseline="0" dirty="0" err="1" smtClean="0">
+                <a:solidFill>
+                  <a:schemeClr val="tx1"/>
+                </a:solidFill>
+                <a:latin typeface="+mn-lt"/>
+                <a:ea typeface="+mn-ea"/>
+                <a:cs typeface="+mn-cs"/>
+              </a:rPr>
+              <a:t>Pemahaman</a:t>
+            </a:r>
+            <a:r>
+              <a:rPr lang="en-US" sz="1200" b="0" i="0" u="none" strike="noStrike" kern="1200" baseline="0" dirty="0" smtClean="0">
+                <a:solidFill>
+                  <a:schemeClr val="tx1"/>
+                </a:solidFill>
+                <a:latin typeface="+mn-lt"/>
+                <a:ea typeface="+mn-ea"/>
+                <a:cs typeface="+mn-cs"/>
+              </a:rPr>
+              <a:t> </a:t>
+            </a:r>
+            <a:r>
+              <a:rPr lang="en-US" sz="1200" b="0" i="0" u="none" strike="noStrike" kern="1200" baseline="0" dirty="0" err="1" smtClean="0">
+                <a:solidFill>
+                  <a:schemeClr val="tx1"/>
+                </a:solidFill>
+                <a:latin typeface="+mn-lt"/>
+                <a:ea typeface="+mn-ea"/>
+                <a:cs typeface="+mn-cs"/>
+              </a:rPr>
+              <a:t>dilakukan</a:t>
+            </a:r>
+            <a:r>
+              <a:rPr lang="en-US" sz="1200" b="0" i="0" u="none" strike="noStrike" kern="1200" baseline="0" dirty="0" smtClean="0">
+                <a:solidFill>
+                  <a:schemeClr val="tx1"/>
+                </a:solidFill>
+                <a:latin typeface="+mn-lt"/>
+                <a:ea typeface="+mn-ea"/>
+                <a:cs typeface="+mn-cs"/>
+              </a:rPr>
+              <a:t> </a:t>
+            </a:r>
+            <a:r>
+              <a:rPr lang="en-US" sz="1200" b="0" i="0" u="none" strike="noStrike" kern="1200" baseline="0" dirty="0" err="1" smtClean="0">
+                <a:solidFill>
+                  <a:schemeClr val="tx1"/>
+                </a:solidFill>
+                <a:latin typeface="+mn-lt"/>
+                <a:ea typeface="+mn-ea"/>
+                <a:cs typeface="+mn-cs"/>
+              </a:rPr>
+              <a:t>dengan</a:t>
+            </a:r>
+            <a:r>
+              <a:rPr lang="en-US" sz="1200" b="0" i="0" u="none" strike="noStrike" kern="1200" baseline="0" dirty="0" smtClean="0">
+                <a:solidFill>
+                  <a:schemeClr val="tx1"/>
+                </a:solidFill>
+                <a:latin typeface="+mn-lt"/>
+                <a:ea typeface="+mn-ea"/>
+                <a:cs typeface="+mn-cs"/>
+              </a:rPr>
+              <a:t> </a:t>
+            </a:r>
+            <a:r>
+              <a:rPr lang="en-US" sz="1200" b="0" i="0" u="none" strike="noStrike" kern="1200" baseline="0" dirty="0" err="1" smtClean="0">
+                <a:solidFill>
+                  <a:schemeClr val="tx1"/>
+                </a:solidFill>
+                <a:latin typeface="+mn-lt"/>
+                <a:ea typeface="+mn-ea"/>
+                <a:cs typeface="+mn-cs"/>
+              </a:rPr>
+              <a:t>membaca</a:t>
+            </a:r>
+            <a:r>
+              <a:rPr lang="en-US" sz="1200" b="0" i="0" u="none" strike="noStrike" kern="1200" baseline="0" dirty="0" smtClean="0">
+                <a:solidFill>
+                  <a:schemeClr val="tx1"/>
+                </a:solidFill>
+                <a:latin typeface="+mn-lt"/>
+                <a:ea typeface="+mn-ea"/>
+                <a:cs typeface="+mn-cs"/>
+              </a:rPr>
+              <a:t> </a:t>
+            </a:r>
+            <a:r>
+              <a:rPr lang="en-US" sz="1200" b="0" i="0" u="none" strike="noStrike" kern="1200" baseline="0" dirty="0" err="1" smtClean="0">
+                <a:solidFill>
+                  <a:schemeClr val="tx1"/>
+                </a:solidFill>
+                <a:latin typeface="+mn-lt"/>
+                <a:ea typeface="+mn-ea"/>
+                <a:cs typeface="+mn-cs"/>
+              </a:rPr>
+              <a:t>deskripsi</a:t>
+            </a:r>
+            <a:r>
+              <a:rPr lang="en-US" sz="1200" b="0" i="0" u="none" strike="noStrike" kern="1200" baseline="0" dirty="0" smtClean="0">
+                <a:solidFill>
+                  <a:schemeClr val="tx1"/>
+                </a:solidFill>
+                <a:latin typeface="+mn-lt"/>
+                <a:ea typeface="+mn-ea"/>
+                <a:cs typeface="+mn-cs"/>
+              </a:rPr>
+              <a:t> </a:t>
+            </a:r>
+            <a:r>
+              <a:rPr lang="en-US" sz="1200" b="0" i="0" u="none" strike="noStrike" kern="1200" baseline="0" dirty="0" err="1" smtClean="0">
+                <a:solidFill>
+                  <a:schemeClr val="tx1"/>
+                </a:solidFill>
+                <a:latin typeface="+mn-lt"/>
+                <a:ea typeface="+mn-ea"/>
+                <a:cs typeface="+mn-cs"/>
+              </a:rPr>
+              <a:t>dari</a:t>
+            </a:r>
+            <a:r>
+              <a:rPr lang="en-US" sz="1200" b="0" i="0" u="none" strike="noStrike" kern="1200" baseline="0" dirty="0" smtClean="0">
+                <a:solidFill>
+                  <a:schemeClr val="tx1"/>
+                </a:solidFill>
+                <a:latin typeface="+mn-lt"/>
+                <a:ea typeface="+mn-ea"/>
+                <a:cs typeface="+mn-cs"/>
+              </a:rPr>
+              <a:t> </a:t>
+            </a:r>
+            <a:r>
+              <a:rPr lang="en-US" sz="1200" b="0" i="0" u="none" strike="noStrike" kern="1200" baseline="0" dirty="0" err="1" smtClean="0">
+                <a:solidFill>
+                  <a:schemeClr val="tx1"/>
+                </a:solidFill>
+                <a:latin typeface="+mn-lt"/>
+                <a:ea typeface="+mn-ea"/>
+                <a:cs typeface="+mn-cs"/>
+              </a:rPr>
+              <a:t>permasalahan</a:t>
+            </a:r>
+            <a:endParaRPr lang="en-US" sz="1200" b="0" i="0" u="none" strike="noStrike" kern="1200" baseline="0" dirty="0" smtClean="0">
+              <a:solidFill>
+                <a:schemeClr val="tx1"/>
+              </a:solidFill>
+              <a:latin typeface="+mn-lt"/>
+              <a:ea typeface="+mn-ea"/>
+              <a:cs typeface="+mn-cs"/>
+            </a:endParaRPr>
+          </a:p>
+          <a:p>
+            <a:r>
+              <a:rPr lang="en-US" sz="1200" b="0" i="0" u="none" strike="noStrike" kern="1200" baseline="0" dirty="0" err="1" smtClean="0">
+                <a:solidFill>
+                  <a:schemeClr val="tx1"/>
+                </a:solidFill>
+                <a:latin typeface="+mn-lt"/>
+                <a:ea typeface="+mn-ea"/>
+                <a:cs typeface="+mn-cs"/>
+              </a:rPr>
+              <a:t>secara</a:t>
+            </a:r>
+            <a:r>
+              <a:rPr lang="en-US" sz="1200" b="0" i="0" u="none" strike="noStrike" kern="1200" baseline="0" dirty="0" smtClean="0">
+                <a:solidFill>
+                  <a:schemeClr val="tx1"/>
+                </a:solidFill>
+                <a:latin typeface="+mn-lt"/>
+                <a:ea typeface="+mn-ea"/>
+                <a:cs typeface="+mn-cs"/>
+              </a:rPr>
+              <a:t> </a:t>
+            </a:r>
+            <a:r>
+              <a:rPr lang="en-US" sz="1200" b="0" i="0" u="none" strike="noStrike" kern="1200" baseline="0" dirty="0" err="1" smtClean="0">
+                <a:solidFill>
+                  <a:schemeClr val="tx1"/>
+                </a:solidFill>
+                <a:latin typeface="+mn-lt"/>
+                <a:ea typeface="+mn-ea"/>
+                <a:cs typeface="+mn-cs"/>
+              </a:rPr>
+              <a:t>baik</a:t>
+            </a:r>
+            <a:r>
+              <a:rPr lang="en-US" sz="1200" b="0" i="0" u="none" strike="noStrike" kern="1200" baseline="0" dirty="0" smtClean="0">
+                <a:solidFill>
+                  <a:schemeClr val="tx1"/>
+                </a:solidFill>
+                <a:latin typeface="+mn-lt"/>
+                <a:ea typeface="+mn-ea"/>
+                <a:cs typeface="+mn-cs"/>
+              </a:rPr>
+              <a:t>. </a:t>
+            </a:r>
+            <a:r>
+              <a:rPr lang="en-US" sz="1200" b="0" i="0" u="none" strike="noStrike" kern="1200" baseline="0" dirty="0" err="1" smtClean="0">
+                <a:solidFill>
+                  <a:schemeClr val="tx1"/>
+                </a:solidFill>
+                <a:latin typeface="+mn-lt"/>
+                <a:ea typeface="+mn-ea"/>
+                <a:cs typeface="+mn-cs"/>
+              </a:rPr>
+              <a:t>Apabila</a:t>
+            </a:r>
+            <a:r>
+              <a:rPr lang="en-US" sz="1200" b="0" i="0" u="none" strike="noStrike" kern="1200" baseline="0" dirty="0" smtClean="0">
+                <a:solidFill>
+                  <a:schemeClr val="tx1"/>
+                </a:solidFill>
+                <a:latin typeface="+mn-lt"/>
+                <a:ea typeface="+mn-ea"/>
+                <a:cs typeface="+mn-cs"/>
+              </a:rPr>
+              <a:t> </a:t>
+            </a:r>
+            <a:r>
+              <a:rPr lang="en-US" sz="1200" b="0" i="0" u="none" strike="noStrike" kern="1200" baseline="0" dirty="0" err="1" smtClean="0">
+                <a:solidFill>
+                  <a:schemeClr val="tx1"/>
+                </a:solidFill>
+                <a:latin typeface="+mn-lt"/>
+                <a:ea typeface="+mn-ea"/>
+                <a:cs typeface="+mn-cs"/>
+              </a:rPr>
+              <a:t>permasalahan</a:t>
+            </a:r>
+            <a:r>
+              <a:rPr lang="en-US" sz="1200" b="0" i="0" u="none" strike="noStrike" kern="1200" baseline="0" dirty="0" smtClean="0">
+                <a:solidFill>
+                  <a:schemeClr val="tx1"/>
+                </a:solidFill>
+                <a:latin typeface="+mn-lt"/>
+                <a:ea typeface="+mn-ea"/>
+                <a:cs typeface="+mn-cs"/>
+              </a:rPr>
+              <a:t> </a:t>
+            </a:r>
+            <a:r>
+              <a:rPr lang="en-US" sz="1200" b="0" i="0" u="none" strike="noStrike" kern="1200" baseline="0" dirty="0" err="1" smtClean="0">
+                <a:solidFill>
+                  <a:schemeClr val="tx1"/>
+                </a:solidFill>
+                <a:latin typeface="+mn-lt"/>
+                <a:ea typeface="+mn-ea"/>
+                <a:cs typeface="+mn-cs"/>
+              </a:rPr>
+              <a:t>tersebut</a:t>
+            </a:r>
+            <a:r>
+              <a:rPr lang="en-US" sz="1200" b="0" i="0" u="none" strike="noStrike" kern="1200" baseline="0" dirty="0" smtClean="0">
+                <a:solidFill>
+                  <a:schemeClr val="tx1"/>
+                </a:solidFill>
+                <a:latin typeface="+mn-lt"/>
+                <a:ea typeface="+mn-ea"/>
+                <a:cs typeface="+mn-cs"/>
+              </a:rPr>
+              <a:t> </a:t>
+            </a:r>
+            <a:r>
+              <a:rPr lang="en-US" sz="1200" b="0" i="0" u="none" strike="noStrike" kern="1200" baseline="0" dirty="0" err="1" smtClean="0">
+                <a:solidFill>
+                  <a:schemeClr val="tx1"/>
+                </a:solidFill>
+                <a:latin typeface="+mn-lt"/>
+                <a:ea typeface="+mn-ea"/>
+                <a:cs typeface="+mn-cs"/>
+              </a:rPr>
+              <a:t>merupakan</a:t>
+            </a:r>
+            <a:endParaRPr lang="en-US" sz="1200" b="0" i="0" u="none" strike="noStrike" kern="1200" baseline="0" dirty="0" smtClean="0">
+              <a:solidFill>
+                <a:schemeClr val="tx1"/>
+              </a:solidFill>
+              <a:latin typeface="+mn-lt"/>
+              <a:ea typeface="+mn-ea"/>
+              <a:cs typeface="+mn-cs"/>
+            </a:endParaRPr>
+          </a:p>
+          <a:p>
+            <a:r>
+              <a:rPr lang="en-US" sz="1200" b="0" i="0" u="none" strike="noStrike" kern="1200" baseline="0" dirty="0" err="1" smtClean="0">
+                <a:solidFill>
+                  <a:schemeClr val="tx1"/>
+                </a:solidFill>
+                <a:latin typeface="+mn-lt"/>
+                <a:ea typeface="+mn-ea"/>
+                <a:cs typeface="+mn-cs"/>
+              </a:rPr>
+              <a:t>permasalahan</a:t>
+            </a:r>
+            <a:r>
+              <a:rPr lang="en-US" sz="1200" b="0" i="0" u="none" strike="noStrike" kern="1200" baseline="0" dirty="0" smtClean="0">
+                <a:solidFill>
+                  <a:schemeClr val="tx1"/>
+                </a:solidFill>
+                <a:latin typeface="+mn-lt"/>
+                <a:ea typeface="+mn-ea"/>
+                <a:cs typeface="+mn-cs"/>
+              </a:rPr>
+              <a:t> </a:t>
+            </a:r>
+            <a:r>
+              <a:rPr lang="en-US" sz="1200" b="0" i="0" u="none" strike="noStrike" kern="1200" baseline="0" dirty="0" err="1" smtClean="0">
+                <a:solidFill>
+                  <a:schemeClr val="tx1"/>
+                </a:solidFill>
+                <a:latin typeface="+mn-lt"/>
+                <a:ea typeface="+mn-ea"/>
+                <a:cs typeface="+mn-cs"/>
+              </a:rPr>
+              <a:t>umum</a:t>
+            </a:r>
+            <a:r>
+              <a:rPr lang="en-US" sz="1200" b="0" i="0" u="none" strike="noStrike" kern="1200" baseline="0" dirty="0" smtClean="0">
+                <a:solidFill>
+                  <a:schemeClr val="tx1"/>
+                </a:solidFill>
+                <a:latin typeface="+mn-lt"/>
+                <a:ea typeface="+mn-ea"/>
+                <a:cs typeface="+mn-cs"/>
+              </a:rPr>
+              <a:t> </a:t>
+            </a:r>
+            <a:r>
+              <a:rPr lang="en-US" sz="1200" b="0" i="0" u="none" strike="noStrike" kern="1200" baseline="0" dirty="0" err="1" smtClean="0">
+                <a:solidFill>
+                  <a:schemeClr val="tx1"/>
+                </a:solidFill>
+                <a:latin typeface="+mn-lt"/>
+                <a:ea typeface="+mn-ea"/>
+                <a:cs typeface="+mn-cs"/>
+              </a:rPr>
+              <a:t>seperti</a:t>
+            </a:r>
+            <a:r>
+              <a:rPr lang="en-US" sz="1200" b="0" i="0" u="none" strike="noStrike" kern="1200" baseline="0" dirty="0" smtClean="0">
+                <a:solidFill>
+                  <a:schemeClr val="tx1"/>
+                </a:solidFill>
+                <a:latin typeface="+mn-lt"/>
+                <a:ea typeface="+mn-ea"/>
+                <a:cs typeface="+mn-cs"/>
+              </a:rPr>
+              <a:t> </a:t>
+            </a:r>
+            <a:r>
+              <a:rPr lang="en-US" sz="1200" b="0" i="0" u="none" strike="noStrike" kern="1200" baseline="0" dirty="0" err="1" smtClean="0">
+                <a:solidFill>
+                  <a:schemeClr val="tx1"/>
+                </a:solidFill>
+                <a:latin typeface="+mn-lt"/>
+                <a:ea typeface="+mn-ea"/>
+                <a:cs typeface="+mn-cs"/>
+              </a:rPr>
+              <a:t>misalnya</a:t>
+            </a:r>
+            <a:r>
+              <a:rPr lang="en-US" sz="1200" b="0" i="0" u="none" strike="noStrike" kern="1200" baseline="0" dirty="0" smtClean="0">
+                <a:solidFill>
+                  <a:schemeClr val="tx1"/>
+                </a:solidFill>
+                <a:latin typeface="+mn-lt"/>
+                <a:ea typeface="+mn-ea"/>
+                <a:cs typeface="+mn-cs"/>
+              </a:rPr>
+              <a:t> </a:t>
+            </a:r>
+            <a:r>
+              <a:rPr lang="en-US" sz="1200" b="0" i="0" u="none" strike="noStrike" kern="1200" baseline="0" dirty="0" err="1" smtClean="0">
+                <a:solidFill>
+                  <a:schemeClr val="tx1"/>
+                </a:solidFill>
+                <a:latin typeface="+mn-lt"/>
+                <a:ea typeface="+mn-ea"/>
+                <a:cs typeface="+mn-cs"/>
+              </a:rPr>
+              <a:t>masalah</a:t>
+            </a:r>
+            <a:r>
+              <a:rPr lang="en-US" sz="1200" b="0" i="0" u="none" strike="noStrike" kern="1200" baseline="0" dirty="0" smtClean="0">
+                <a:solidFill>
+                  <a:schemeClr val="tx1"/>
+                </a:solidFill>
+                <a:latin typeface="+mn-lt"/>
+                <a:ea typeface="+mn-ea"/>
+                <a:cs typeface="+mn-cs"/>
+              </a:rPr>
+              <a:t> </a:t>
+            </a:r>
+            <a:r>
+              <a:rPr lang="en-US" sz="1200" b="0" i="0" u="none" strike="noStrike" kern="1200" baseline="0" dirty="0" err="1" smtClean="0">
+                <a:solidFill>
+                  <a:schemeClr val="tx1"/>
+                </a:solidFill>
+                <a:latin typeface="+mn-lt"/>
+                <a:ea typeface="+mn-ea"/>
+                <a:cs typeface="+mn-cs"/>
+              </a:rPr>
+              <a:t>pengurutan</a:t>
+            </a:r>
+            <a:r>
+              <a:rPr lang="en-US" sz="1200" b="0" i="0" u="none" strike="noStrike" kern="1200" baseline="0" dirty="0" smtClean="0">
+                <a:solidFill>
+                  <a:schemeClr val="tx1"/>
+                </a:solidFill>
+                <a:latin typeface="+mn-lt"/>
+                <a:ea typeface="+mn-ea"/>
+                <a:cs typeface="+mn-cs"/>
+              </a:rPr>
+              <a:t>, </a:t>
+            </a:r>
+            <a:r>
+              <a:rPr lang="en-US" sz="1200" b="0" i="0" u="none" strike="noStrike" kern="1200" baseline="0" dirty="0" err="1" smtClean="0">
+                <a:solidFill>
+                  <a:schemeClr val="tx1"/>
+                </a:solidFill>
+                <a:latin typeface="+mn-lt"/>
+                <a:ea typeface="+mn-ea"/>
+                <a:cs typeface="+mn-cs"/>
+              </a:rPr>
+              <a:t>maka</a:t>
+            </a:r>
+            <a:endParaRPr lang="en-US" sz="1200" b="0" i="0" u="none" strike="noStrike" kern="1200" baseline="0" dirty="0" smtClean="0">
+              <a:solidFill>
+                <a:schemeClr val="tx1"/>
+              </a:solidFill>
+              <a:latin typeface="+mn-lt"/>
+              <a:ea typeface="+mn-ea"/>
+              <a:cs typeface="+mn-cs"/>
+            </a:endParaRPr>
+          </a:p>
+          <a:p>
+            <a:r>
+              <a:rPr lang="en-US" sz="1200" b="0" i="0" u="none" strike="noStrike" kern="1200" baseline="0" dirty="0" err="1" smtClean="0">
+                <a:solidFill>
+                  <a:schemeClr val="tx1"/>
+                </a:solidFill>
+                <a:latin typeface="+mn-lt"/>
+                <a:ea typeface="+mn-ea"/>
+                <a:cs typeface="+mn-cs"/>
+              </a:rPr>
+              <a:t>kita</a:t>
+            </a:r>
+            <a:r>
+              <a:rPr lang="en-US" sz="1200" b="0" i="0" u="none" strike="noStrike" kern="1200" baseline="0" dirty="0" smtClean="0">
+                <a:solidFill>
+                  <a:schemeClr val="tx1"/>
+                </a:solidFill>
+                <a:latin typeface="+mn-lt"/>
+                <a:ea typeface="+mn-ea"/>
+                <a:cs typeface="+mn-cs"/>
+              </a:rPr>
+              <a:t> </a:t>
+            </a:r>
+            <a:r>
+              <a:rPr lang="en-US" sz="1200" b="0" i="0" u="none" strike="noStrike" kern="1200" baseline="0" dirty="0" err="1" smtClean="0">
+                <a:solidFill>
+                  <a:schemeClr val="tx1"/>
+                </a:solidFill>
+                <a:latin typeface="+mn-lt"/>
+                <a:ea typeface="+mn-ea"/>
+                <a:cs typeface="+mn-cs"/>
+              </a:rPr>
+              <a:t>bisa</a:t>
+            </a:r>
+            <a:r>
+              <a:rPr lang="en-US" sz="1200" b="0" i="0" u="none" strike="noStrike" kern="1200" baseline="0" dirty="0" smtClean="0">
+                <a:solidFill>
+                  <a:schemeClr val="tx1"/>
+                </a:solidFill>
+                <a:latin typeface="+mn-lt"/>
+                <a:ea typeface="+mn-ea"/>
+                <a:cs typeface="+mn-cs"/>
+              </a:rPr>
+              <a:t> </a:t>
+            </a:r>
+            <a:r>
+              <a:rPr lang="en-US" sz="1200" b="0" i="0" u="none" strike="noStrike" kern="1200" baseline="0" dirty="0" err="1" smtClean="0">
+                <a:solidFill>
+                  <a:schemeClr val="tx1"/>
+                </a:solidFill>
+                <a:latin typeface="+mn-lt"/>
+                <a:ea typeface="+mn-ea"/>
+                <a:cs typeface="+mn-cs"/>
+              </a:rPr>
+              <a:t>menggunakan</a:t>
+            </a:r>
+            <a:r>
+              <a:rPr lang="en-US" sz="1200" b="0" i="0" u="none" strike="noStrike" kern="1200" baseline="0" dirty="0" smtClean="0">
+                <a:solidFill>
+                  <a:schemeClr val="tx1"/>
+                </a:solidFill>
+                <a:latin typeface="+mn-lt"/>
+                <a:ea typeface="+mn-ea"/>
+                <a:cs typeface="+mn-cs"/>
+              </a:rPr>
+              <a:t> </a:t>
+            </a:r>
+            <a:r>
+              <a:rPr lang="en-US" sz="1200" b="0" i="0" u="none" strike="noStrike" kern="1200" baseline="0" dirty="0" err="1" smtClean="0">
+                <a:solidFill>
+                  <a:schemeClr val="tx1"/>
+                </a:solidFill>
+                <a:latin typeface="+mn-lt"/>
+                <a:ea typeface="+mn-ea"/>
+                <a:cs typeface="+mn-cs"/>
+              </a:rPr>
+              <a:t>algoritma</a:t>
+            </a:r>
+            <a:r>
+              <a:rPr lang="en-US" sz="1200" b="0" i="0" u="none" strike="noStrike" kern="1200" baseline="0" dirty="0" smtClean="0">
+                <a:solidFill>
+                  <a:schemeClr val="tx1"/>
+                </a:solidFill>
+                <a:latin typeface="+mn-lt"/>
+                <a:ea typeface="+mn-ea"/>
+                <a:cs typeface="+mn-cs"/>
+              </a:rPr>
+              <a:t> yang </a:t>
+            </a:r>
+            <a:r>
+              <a:rPr lang="en-US" sz="1200" b="0" i="0" u="none" strike="noStrike" kern="1200" baseline="0" dirty="0" err="1" smtClean="0">
+                <a:solidFill>
+                  <a:schemeClr val="tx1"/>
+                </a:solidFill>
+                <a:latin typeface="+mn-lt"/>
+                <a:ea typeface="+mn-ea"/>
+                <a:cs typeface="+mn-cs"/>
+              </a:rPr>
+              <a:t>sudah</a:t>
+            </a:r>
+            <a:r>
+              <a:rPr lang="en-US" sz="1200" b="0" i="0" u="none" strike="noStrike" kern="1200" baseline="0" dirty="0" smtClean="0">
+                <a:solidFill>
+                  <a:schemeClr val="tx1"/>
+                </a:solidFill>
+                <a:latin typeface="+mn-lt"/>
+                <a:ea typeface="+mn-ea"/>
+                <a:cs typeface="+mn-cs"/>
+              </a:rPr>
+              <a:t> </a:t>
+            </a:r>
+            <a:r>
+              <a:rPr lang="en-US" sz="1200" b="0" i="0" u="none" strike="noStrike" kern="1200" baseline="0" dirty="0" err="1" smtClean="0">
+                <a:solidFill>
+                  <a:schemeClr val="tx1"/>
+                </a:solidFill>
+                <a:latin typeface="+mn-lt"/>
+                <a:ea typeface="+mn-ea"/>
+                <a:cs typeface="+mn-cs"/>
+              </a:rPr>
+              <a:t>ada</a:t>
+            </a:r>
+            <a:r>
+              <a:rPr lang="en-US" sz="1200" b="0" i="0" u="none" strike="noStrike" kern="1200" baseline="0" dirty="0" smtClean="0">
+                <a:solidFill>
+                  <a:schemeClr val="tx1"/>
+                </a:solidFill>
+                <a:latin typeface="+mn-lt"/>
+                <a:ea typeface="+mn-ea"/>
+                <a:cs typeface="+mn-cs"/>
+              </a:rPr>
+              <a:t> </a:t>
+            </a:r>
+            <a:r>
+              <a:rPr lang="en-US" sz="1200" b="0" i="0" u="none" strike="noStrike" kern="1200" baseline="0" dirty="0" err="1" smtClean="0">
+                <a:solidFill>
+                  <a:schemeClr val="tx1"/>
+                </a:solidFill>
+                <a:latin typeface="+mn-lt"/>
+                <a:ea typeface="+mn-ea"/>
+                <a:cs typeface="+mn-cs"/>
+              </a:rPr>
+              <a:t>untuk</a:t>
+            </a:r>
+            <a:r>
+              <a:rPr lang="en-US" sz="1200" b="0" i="0" u="none" strike="noStrike" kern="1200" baseline="0" dirty="0" smtClean="0">
+                <a:solidFill>
+                  <a:schemeClr val="tx1"/>
+                </a:solidFill>
+                <a:latin typeface="+mn-lt"/>
+                <a:ea typeface="+mn-ea"/>
+                <a:cs typeface="+mn-cs"/>
+              </a:rPr>
+              <a:t> </a:t>
+            </a:r>
+            <a:r>
+              <a:rPr lang="en-US" sz="1200" b="0" i="0" u="none" strike="noStrike" kern="1200" baseline="0" dirty="0" err="1" smtClean="0">
+                <a:solidFill>
+                  <a:schemeClr val="tx1"/>
+                </a:solidFill>
+                <a:latin typeface="+mn-lt"/>
+                <a:ea typeface="+mn-ea"/>
+                <a:cs typeface="+mn-cs"/>
+              </a:rPr>
+              <a:t>menyelesaikan</a:t>
+            </a:r>
+            <a:r>
+              <a:rPr lang="en-US" sz="1200" b="0" i="0" u="none" strike="noStrike" kern="1200" baseline="0" dirty="0" smtClean="0">
+                <a:solidFill>
+                  <a:schemeClr val="tx1"/>
+                </a:solidFill>
+                <a:latin typeface="+mn-lt"/>
+                <a:ea typeface="+mn-ea"/>
+                <a:cs typeface="+mn-cs"/>
+              </a:rPr>
+              <a:t>.</a:t>
+            </a:r>
+          </a:p>
+          <a:p>
+            <a:r>
+              <a:rPr lang="en-US" sz="1200" b="0" i="0" u="none" strike="noStrike" kern="1200" baseline="0" dirty="0" err="1" smtClean="0">
+                <a:solidFill>
+                  <a:schemeClr val="tx1"/>
+                </a:solidFill>
+                <a:latin typeface="+mn-lt"/>
+                <a:ea typeface="+mn-ea"/>
+                <a:cs typeface="+mn-cs"/>
+              </a:rPr>
+              <a:t>Jika</a:t>
+            </a:r>
+            <a:r>
+              <a:rPr lang="en-US" sz="1200" b="0" i="0" u="none" strike="noStrike" kern="1200" baseline="0" dirty="0" smtClean="0">
+                <a:solidFill>
+                  <a:schemeClr val="tx1"/>
+                </a:solidFill>
+                <a:latin typeface="+mn-lt"/>
+                <a:ea typeface="+mn-ea"/>
+                <a:cs typeface="+mn-cs"/>
+              </a:rPr>
+              <a:t> </a:t>
+            </a:r>
+            <a:r>
+              <a:rPr lang="en-US" sz="1200" b="0" i="0" u="none" strike="noStrike" kern="1200" baseline="0" dirty="0" err="1" smtClean="0">
+                <a:solidFill>
+                  <a:schemeClr val="tx1"/>
+                </a:solidFill>
+                <a:latin typeface="+mn-lt"/>
+                <a:ea typeface="+mn-ea"/>
+                <a:cs typeface="+mn-cs"/>
+              </a:rPr>
+              <a:t>tidak</a:t>
+            </a:r>
+            <a:r>
+              <a:rPr lang="en-US" sz="1200" b="0" i="0" u="none" strike="noStrike" kern="1200" baseline="0" dirty="0" smtClean="0">
+                <a:solidFill>
+                  <a:schemeClr val="tx1"/>
+                </a:solidFill>
+                <a:latin typeface="+mn-lt"/>
+                <a:ea typeface="+mn-ea"/>
+                <a:cs typeface="+mn-cs"/>
+              </a:rPr>
+              <a:t>, </a:t>
+            </a:r>
+            <a:r>
+              <a:rPr lang="en-US" sz="1200" b="0" i="0" u="none" strike="noStrike" kern="1200" baseline="0" dirty="0" err="1" smtClean="0">
+                <a:solidFill>
+                  <a:schemeClr val="tx1"/>
+                </a:solidFill>
+                <a:latin typeface="+mn-lt"/>
+                <a:ea typeface="+mn-ea"/>
+                <a:cs typeface="+mn-cs"/>
+              </a:rPr>
+              <a:t>maka</a:t>
+            </a:r>
+            <a:r>
+              <a:rPr lang="en-US" sz="1200" b="0" i="0" u="none" strike="noStrike" kern="1200" baseline="0" dirty="0" smtClean="0">
+                <a:solidFill>
+                  <a:schemeClr val="tx1"/>
+                </a:solidFill>
+                <a:latin typeface="+mn-lt"/>
+                <a:ea typeface="+mn-ea"/>
+                <a:cs typeface="+mn-cs"/>
+              </a:rPr>
+              <a:t> </a:t>
+            </a:r>
+            <a:r>
+              <a:rPr lang="en-US" sz="1200" b="0" i="0" u="none" strike="noStrike" kern="1200" baseline="0" dirty="0" err="1" smtClean="0">
+                <a:solidFill>
+                  <a:schemeClr val="tx1"/>
+                </a:solidFill>
+                <a:latin typeface="+mn-lt"/>
+                <a:ea typeface="+mn-ea"/>
+                <a:cs typeface="+mn-cs"/>
+              </a:rPr>
+              <a:t>kita</a:t>
+            </a:r>
+            <a:r>
+              <a:rPr lang="en-US" sz="1200" b="0" i="0" u="none" strike="noStrike" kern="1200" baseline="0" dirty="0" smtClean="0">
+                <a:solidFill>
+                  <a:schemeClr val="tx1"/>
+                </a:solidFill>
+                <a:latin typeface="+mn-lt"/>
+                <a:ea typeface="+mn-ea"/>
+                <a:cs typeface="+mn-cs"/>
+              </a:rPr>
+              <a:t> </a:t>
+            </a:r>
+            <a:r>
+              <a:rPr lang="en-US" sz="1200" b="0" i="0" u="none" strike="noStrike" kern="1200" baseline="0" dirty="0" err="1" smtClean="0">
+                <a:solidFill>
+                  <a:schemeClr val="tx1"/>
+                </a:solidFill>
+                <a:latin typeface="+mn-lt"/>
+                <a:ea typeface="+mn-ea"/>
+                <a:cs typeface="+mn-cs"/>
+              </a:rPr>
+              <a:t>harus</a:t>
+            </a:r>
+            <a:r>
+              <a:rPr lang="en-US" sz="1200" b="0" i="0" u="none" strike="noStrike" kern="1200" baseline="0" dirty="0" smtClean="0">
+                <a:solidFill>
+                  <a:schemeClr val="tx1"/>
+                </a:solidFill>
+                <a:latin typeface="+mn-lt"/>
+                <a:ea typeface="+mn-ea"/>
+                <a:cs typeface="+mn-cs"/>
+              </a:rPr>
+              <a:t> </a:t>
+            </a:r>
+            <a:r>
+              <a:rPr lang="en-US" sz="1200" b="0" i="0" u="none" strike="noStrike" kern="1200" baseline="0" dirty="0" err="1" smtClean="0">
+                <a:solidFill>
+                  <a:schemeClr val="tx1"/>
+                </a:solidFill>
+                <a:latin typeface="+mn-lt"/>
+                <a:ea typeface="+mn-ea"/>
+                <a:cs typeface="+mn-cs"/>
+              </a:rPr>
+              <a:t>mendesain</a:t>
+            </a:r>
+            <a:r>
+              <a:rPr lang="en-US" sz="1200" b="0" i="0" u="none" strike="noStrike" kern="1200" baseline="0" dirty="0" smtClean="0">
+                <a:solidFill>
+                  <a:schemeClr val="tx1"/>
+                </a:solidFill>
+                <a:latin typeface="+mn-lt"/>
+                <a:ea typeface="+mn-ea"/>
+                <a:cs typeface="+mn-cs"/>
+              </a:rPr>
+              <a:t> </a:t>
+            </a:r>
+            <a:r>
+              <a:rPr lang="en-US" sz="1200" b="0" i="0" u="none" strike="noStrike" kern="1200" baseline="0" dirty="0" err="1" smtClean="0">
+                <a:solidFill>
+                  <a:schemeClr val="tx1"/>
+                </a:solidFill>
+                <a:latin typeface="+mn-lt"/>
+                <a:ea typeface="+mn-ea"/>
+                <a:cs typeface="+mn-cs"/>
+              </a:rPr>
+              <a:t>dari</a:t>
+            </a:r>
+            <a:r>
+              <a:rPr lang="en-US" sz="1200" b="0" i="0" u="none" strike="noStrike" kern="1200" baseline="0" dirty="0" smtClean="0">
+                <a:solidFill>
+                  <a:schemeClr val="tx1"/>
+                </a:solidFill>
+                <a:latin typeface="+mn-lt"/>
+                <a:ea typeface="+mn-ea"/>
+                <a:cs typeface="+mn-cs"/>
+              </a:rPr>
+              <a:t> </a:t>
+            </a:r>
+            <a:r>
+              <a:rPr lang="en-US" sz="1200" b="0" i="0" u="none" strike="noStrike" kern="1200" baseline="0" dirty="0" err="1" smtClean="0">
+                <a:solidFill>
+                  <a:schemeClr val="tx1"/>
+                </a:solidFill>
+                <a:latin typeface="+mn-lt"/>
+                <a:ea typeface="+mn-ea"/>
+                <a:cs typeface="+mn-cs"/>
+              </a:rPr>
+              <a:t>awal</a:t>
+            </a:r>
+            <a:r>
+              <a:rPr lang="en-US" sz="1200" b="0" i="0" u="none" strike="noStrike" kern="1200" baseline="0" dirty="0" smtClean="0">
+                <a:solidFill>
+                  <a:schemeClr val="tx1"/>
+                </a:solidFill>
+                <a:latin typeface="+mn-lt"/>
+                <a:ea typeface="+mn-ea"/>
+                <a:cs typeface="+mn-cs"/>
+              </a:rPr>
+              <a:t> </a:t>
+            </a:r>
+            <a:r>
+              <a:rPr lang="en-US" sz="1200" b="0" i="0" u="none" strike="noStrike" kern="1200" baseline="0" dirty="0" err="1" smtClean="0">
+                <a:solidFill>
+                  <a:schemeClr val="tx1"/>
+                </a:solidFill>
+                <a:latin typeface="+mn-lt"/>
+                <a:ea typeface="+mn-ea"/>
+                <a:cs typeface="+mn-cs"/>
+              </a:rPr>
+              <a:t>algoritma</a:t>
+            </a:r>
+            <a:endParaRPr lang="en-US" sz="1200" b="0" i="0" u="none" strike="noStrike" kern="1200" baseline="0" dirty="0" smtClean="0">
+              <a:solidFill>
+                <a:schemeClr val="tx1"/>
+              </a:solidFill>
+              <a:latin typeface="+mn-lt"/>
+              <a:ea typeface="+mn-ea"/>
+              <a:cs typeface="+mn-cs"/>
+            </a:endParaRPr>
+          </a:p>
+          <a:p>
+            <a:r>
+              <a:rPr lang="en-US" sz="1200" b="0" i="0" u="none" strike="noStrike" kern="1200" baseline="0" dirty="0" err="1" smtClean="0">
+                <a:solidFill>
+                  <a:schemeClr val="tx1"/>
+                </a:solidFill>
+                <a:latin typeface="+mn-lt"/>
+                <a:ea typeface="+mn-ea"/>
+                <a:cs typeface="+mn-cs"/>
+              </a:rPr>
+              <a:t>tersebut</a:t>
+            </a:r>
+            <a:r>
+              <a:rPr lang="en-US" sz="1200" b="0" i="0" u="none" strike="noStrike" kern="1200" baseline="0" dirty="0" smtClean="0">
+                <a:solidFill>
+                  <a:schemeClr val="tx1"/>
+                </a:solidFill>
+                <a:latin typeface="+mn-lt"/>
+                <a:ea typeface="+mn-ea"/>
+                <a:cs typeface="+mn-cs"/>
+              </a:rPr>
+              <a:t>.</a:t>
+            </a:r>
+          </a:p>
+          <a:p>
+            <a:r>
+              <a:rPr lang="en-US" sz="1200" b="0" i="0" u="none" strike="noStrike" kern="1200" baseline="0" dirty="0" smtClean="0">
+                <a:solidFill>
+                  <a:schemeClr val="tx1"/>
+                </a:solidFill>
+                <a:latin typeface="+mn-lt"/>
+                <a:ea typeface="+mn-ea"/>
+                <a:cs typeface="+mn-cs"/>
+              </a:rPr>
+              <a:t>Hal lain yang </a:t>
+            </a:r>
+            <a:r>
+              <a:rPr lang="en-US" sz="1200" b="0" i="0" u="none" strike="noStrike" kern="1200" baseline="0" dirty="0" err="1" smtClean="0">
+                <a:solidFill>
+                  <a:schemeClr val="tx1"/>
+                </a:solidFill>
+                <a:latin typeface="+mn-lt"/>
+                <a:ea typeface="+mn-ea"/>
+                <a:cs typeface="+mn-cs"/>
+              </a:rPr>
+              <a:t>perlu</a:t>
+            </a:r>
+            <a:r>
+              <a:rPr lang="en-US" sz="1200" b="0" i="0" u="none" strike="noStrike" kern="1200" baseline="0" dirty="0" smtClean="0">
+                <a:solidFill>
+                  <a:schemeClr val="tx1"/>
+                </a:solidFill>
+                <a:latin typeface="+mn-lt"/>
+                <a:ea typeface="+mn-ea"/>
+                <a:cs typeface="+mn-cs"/>
+              </a:rPr>
+              <a:t> </a:t>
+            </a:r>
+            <a:r>
+              <a:rPr lang="en-US" sz="1200" b="0" i="0" u="none" strike="noStrike" kern="1200" baseline="0" dirty="0" err="1" smtClean="0">
+                <a:solidFill>
+                  <a:schemeClr val="tx1"/>
+                </a:solidFill>
+                <a:latin typeface="+mn-lt"/>
+                <a:ea typeface="+mn-ea"/>
+                <a:cs typeface="+mn-cs"/>
+              </a:rPr>
+              <a:t>diperhatikan</a:t>
+            </a:r>
+            <a:r>
+              <a:rPr lang="en-US" sz="1200" b="0" i="0" u="none" strike="noStrike" kern="1200" baseline="0" dirty="0" smtClean="0">
+                <a:solidFill>
+                  <a:schemeClr val="tx1"/>
+                </a:solidFill>
+                <a:latin typeface="+mn-lt"/>
+                <a:ea typeface="+mn-ea"/>
+                <a:cs typeface="+mn-cs"/>
+              </a:rPr>
+              <a:t> </a:t>
+            </a:r>
+            <a:r>
+              <a:rPr lang="en-US" sz="1200" b="0" i="0" u="none" strike="noStrike" kern="1200" baseline="0" dirty="0" err="1" smtClean="0">
+                <a:solidFill>
+                  <a:schemeClr val="tx1"/>
+                </a:solidFill>
+                <a:latin typeface="+mn-lt"/>
+                <a:ea typeface="+mn-ea"/>
+                <a:cs typeface="+mn-cs"/>
+              </a:rPr>
+              <a:t>baik-baik</a:t>
+            </a:r>
+            <a:r>
+              <a:rPr lang="en-US" sz="1200" b="0" i="0" u="none" strike="noStrike" kern="1200" baseline="0" dirty="0" smtClean="0">
+                <a:solidFill>
+                  <a:schemeClr val="tx1"/>
+                </a:solidFill>
+                <a:latin typeface="+mn-lt"/>
+                <a:ea typeface="+mn-ea"/>
+                <a:cs typeface="+mn-cs"/>
+              </a:rPr>
+              <a:t> </a:t>
+            </a:r>
+            <a:r>
+              <a:rPr lang="en-US" sz="1200" b="0" i="0" u="none" strike="noStrike" kern="1200" baseline="0" dirty="0" err="1" smtClean="0">
+                <a:solidFill>
+                  <a:schemeClr val="tx1"/>
+                </a:solidFill>
+                <a:latin typeface="+mn-lt"/>
+                <a:ea typeface="+mn-ea"/>
+                <a:cs typeface="+mn-cs"/>
+              </a:rPr>
+              <a:t>adalah</a:t>
+            </a:r>
+            <a:r>
+              <a:rPr lang="en-US" sz="1200" b="0" i="0" u="none" strike="noStrike" kern="1200" baseline="0" dirty="0" smtClean="0">
+                <a:solidFill>
+                  <a:schemeClr val="tx1"/>
+                </a:solidFill>
+                <a:latin typeface="+mn-lt"/>
+                <a:ea typeface="+mn-ea"/>
+                <a:cs typeface="+mn-cs"/>
+              </a:rPr>
+              <a:t> </a:t>
+            </a:r>
+            <a:r>
+              <a:rPr lang="en-US" sz="1200" b="0" i="0" u="none" strike="noStrike" kern="1200" baseline="0" dirty="0" err="1" smtClean="0">
+                <a:solidFill>
+                  <a:schemeClr val="tx1"/>
+                </a:solidFill>
+                <a:latin typeface="+mn-lt"/>
+                <a:ea typeface="+mn-ea"/>
+                <a:cs typeface="+mn-cs"/>
+              </a:rPr>
+              <a:t>masukan</a:t>
+            </a:r>
+            <a:endParaRPr lang="en-US" sz="1200" b="0" i="0" u="none" strike="noStrike" kern="1200" baseline="0" dirty="0" smtClean="0">
+              <a:solidFill>
+                <a:schemeClr val="tx1"/>
+              </a:solidFill>
+              <a:latin typeface="+mn-lt"/>
+              <a:ea typeface="+mn-ea"/>
+              <a:cs typeface="+mn-cs"/>
+            </a:endParaRPr>
+          </a:p>
+          <a:p>
+            <a:r>
+              <a:rPr lang="en-US" sz="1200" b="0" i="0" u="none" strike="noStrike" kern="1200" baseline="0" dirty="0" smtClean="0">
+                <a:solidFill>
+                  <a:schemeClr val="tx1"/>
+                </a:solidFill>
+                <a:latin typeface="+mn-lt"/>
+                <a:ea typeface="+mn-ea"/>
+                <a:cs typeface="+mn-cs"/>
+              </a:rPr>
+              <a:t>(</a:t>
+            </a:r>
+            <a:r>
+              <a:rPr lang="en-US" sz="1200" b="0" i="1" u="none" strike="noStrike" kern="1200" baseline="0" dirty="0" smtClean="0">
+                <a:solidFill>
+                  <a:schemeClr val="tx1"/>
+                </a:solidFill>
+                <a:latin typeface="+mn-lt"/>
+                <a:ea typeface="+mn-ea"/>
+                <a:cs typeface="+mn-cs"/>
+              </a:rPr>
+              <a:t>input</a:t>
+            </a:r>
+            <a:r>
+              <a:rPr lang="en-US" sz="1200" b="0" i="0" u="none" strike="noStrike" kern="1200" baseline="0" dirty="0" smtClean="0">
+                <a:solidFill>
+                  <a:schemeClr val="tx1"/>
+                </a:solidFill>
+                <a:latin typeface="+mn-lt"/>
+                <a:ea typeface="+mn-ea"/>
+                <a:cs typeface="+mn-cs"/>
+              </a:rPr>
+              <a:t>) </a:t>
+            </a:r>
+            <a:r>
+              <a:rPr lang="en-US" sz="1200" b="0" i="0" u="none" strike="noStrike" kern="1200" baseline="0" dirty="0" err="1" smtClean="0">
+                <a:solidFill>
+                  <a:schemeClr val="tx1"/>
+                </a:solidFill>
+                <a:latin typeface="+mn-lt"/>
+                <a:ea typeface="+mn-ea"/>
+                <a:cs typeface="+mn-cs"/>
+              </a:rPr>
+              <a:t>untuk</a:t>
+            </a:r>
+            <a:r>
+              <a:rPr lang="en-US" sz="1200" b="0" i="0" u="none" strike="noStrike" kern="1200" baseline="0" dirty="0" smtClean="0">
+                <a:solidFill>
+                  <a:schemeClr val="tx1"/>
+                </a:solidFill>
+                <a:latin typeface="+mn-lt"/>
+                <a:ea typeface="+mn-ea"/>
+                <a:cs typeface="+mn-cs"/>
+              </a:rPr>
+              <a:t> </a:t>
+            </a:r>
+            <a:r>
+              <a:rPr lang="en-US" sz="1200" b="0" i="0" u="none" strike="noStrike" kern="1200" baseline="0" dirty="0" err="1" smtClean="0">
+                <a:solidFill>
+                  <a:schemeClr val="tx1"/>
+                </a:solidFill>
+                <a:latin typeface="+mn-lt"/>
+                <a:ea typeface="+mn-ea"/>
+                <a:cs typeface="+mn-cs"/>
+              </a:rPr>
+              <a:t>permasalahan</a:t>
+            </a:r>
+            <a:r>
+              <a:rPr lang="en-US" sz="1200" b="0" i="0" u="none" strike="noStrike" kern="1200" baseline="0" dirty="0" smtClean="0">
+                <a:solidFill>
+                  <a:schemeClr val="tx1"/>
+                </a:solidFill>
+                <a:latin typeface="+mn-lt"/>
+                <a:ea typeface="+mn-ea"/>
+                <a:cs typeface="+mn-cs"/>
+              </a:rPr>
+              <a:t> </a:t>
+            </a:r>
+            <a:r>
+              <a:rPr lang="en-US" sz="1200" b="0" i="0" u="none" strike="noStrike" kern="1200" baseline="0" dirty="0" err="1" smtClean="0">
+                <a:solidFill>
+                  <a:schemeClr val="tx1"/>
+                </a:solidFill>
+                <a:latin typeface="+mn-lt"/>
+                <a:ea typeface="+mn-ea"/>
+                <a:cs typeface="+mn-cs"/>
+              </a:rPr>
+              <a:t>tersebut</a:t>
+            </a:r>
+            <a:r>
+              <a:rPr lang="en-US" sz="1200" b="0" i="0" u="none" strike="noStrike" kern="1200" baseline="0" dirty="0" smtClean="0">
+                <a:solidFill>
+                  <a:schemeClr val="tx1"/>
+                </a:solidFill>
+                <a:latin typeface="+mn-lt"/>
+                <a:ea typeface="+mn-ea"/>
+                <a:cs typeface="+mn-cs"/>
+              </a:rPr>
+              <a:t>. </a:t>
+            </a:r>
+            <a:r>
+              <a:rPr lang="en-US" sz="1200" b="0" i="0" u="none" strike="noStrike" kern="1200" baseline="0" dirty="0" err="1" smtClean="0">
+                <a:solidFill>
+                  <a:schemeClr val="tx1"/>
+                </a:solidFill>
+                <a:latin typeface="+mn-lt"/>
+                <a:ea typeface="+mn-ea"/>
+                <a:cs typeface="+mn-cs"/>
+              </a:rPr>
+              <a:t>Besarnya</a:t>
+            </a:r>
+            <a:r>
+              <a:rPr lang="en-US" sz="1200" b="0" i="0" u="none" strike="noStrike" kern="1200" baseline="0" dirty="0" smtClean="0">
+                <a:solidFill>
+                  <a:schemeClr val="tx1"/>
+                </a:solidFill>
+                <a:latin typeface="+mn-lt"/>
+                <a:ea typeface="+mn-ea"/>
+                <a:cs typeface="+mn-cs"/>
+              </a:rPr>
+              <a:t> </a:t>
+            </a:r>
+            <a:r>
+              <a:rPr lang="en-US" sz="1200" b="0" i="0" u="none" strike="noStrike" kern="1200" baseline="0" dirty="0" err="1" smtClean="0">
+                <a:solidFill>
+                  <a:schemeClr val="tx1"/>
+                </a:solidFill>
+                <a:latin typeface="+mn-lt"/>
+                <a:ea typeface="+mn-ea"/>
+                <a:cs typeface="+mn-cs"/>
+              </a:rPr>
+              <a:t>ukuran</a:t>
+            </a:r>
+            <a:r>
+              <a:rPr lang="en-US" sz="1200" b="0" i="0" u="none" strike="noStrike" kern="1200" baseline="0" dirty="0" smtClean="0">
+                <a:solidFill>
+                  <a:schemeClr val="tx1"/>
+                </a:solidFill>
+                <a:latin typeface="+mn-lt"/>
+                <a:ea typeface="+mn-ea"/>
+                <a:cs typeface="+mn-cs"/>
+              </a:rPr>
+              <a:t> </a:t>
+            </a:r>
+            <a:r>
+              <a:rPr lang="en-US" sz="1200" b="0" i="0" u="none" strike="noStrike" kern="1200" baseline="0" dirty="0" err="1" smtClean="0">
+                <a:solidFill>
+                  <a:schemeClr val="tx1"/>
+                </a:solidFill>
+                <a:latin typeface="+mn-lt"/>
+                <a:ea typeface="+mn-ea"/>
+                <a:cs typeface="+mn-cs"/>
+              </a:rPr>
+              <a:t>masukan</a:t>
+            </a:r>
+            <a:endParaRPr lang="en-US" sz="1200" b="0" i="0" u="none" strike="noStrike" kern="1200" baseline="0" dirty="0" smtClean="0">
+              <a:solidFill>
+                <a:schemeClr val="tx1"/>
+              </a:solidFill>
+              <a:latin typeface="+mn-lt"/>
+              <a:ea typeface="+mn-ea"/>
+              <a:cs typeface="+mn-cs"/>
+            </a:endParaRPr>
+          </a:p>
+          <a:p>
+            <a:r>
+              <a:rPr lang="fi-FI" sz="1200" b="0" i="0" u="none" strike="noStrike" kern="1200" baseline="0" dirty="0" smtClean="0">
+                <a:solidFill>
+                  <a:schemeClr val="tx1"/>
+                </a:solidFill>
+                <a:latin typeface="+mn-lt"/>
+                <a:ea typeface="+mn-ea"/>
+                <a:cs typeface="+mn-cs"/>
+              </a:rPr>
+              <a:t>menentukan algoritma yang akan kita gunakan.</a:t>
+            </a:r>
+            <a:endParaRPr lang="en-US" dirty="0"/>
+          </a:p>
+        </p:txBody>
+      </p:sp>
+      <p:sp>
+        <p:nvSpPr>
+          <p:cNvPr id="4" name="Slide Number Placeholder 3"/>
+          <p:cNvSpPr>
+            <a:spLocks noGrp="1"/>
+          </p:cNvSpPr>
+          <p:nvPr>
+            <p:ph type="sldNum" sz="quarter" idx="10"/>
+          </p:nvPr>
+        </p:nvSpPr>
+        <p:spPr/>
+        <p:txBody>
+          <a:bodyPr/>
+          <a:lstStyle/>
+          <a:p>
+            <a:fld id="{2F19F918-7AB5-42C2-AED8-408C377E077E}" type="slidenum">
+              <a:rPr lang="en-US" smtClean="0"/>
+              <a:t>4</a:t>
+            </a:fld>
+            <a:endParaRPr lang="en-US"/>
+          </a:p>
+        </p:txBody>
+      </p:sp>
+    </p:spTree>
+    <p:extLst>
+      <p:ext uri="{BB962C8B-B14F-4D97-AF65-F5344CB8AC3E}">
+        <p14:creationId xmlns:p14="http://schemas.microsoft.com/office/powerpoint/2010/main" val="2725884540"/>
+      </p:ext>
+    </p:extLst>
+  </p:cSld>
+  <p:clrMapOvr>
+    <a:masterClrMapping/>
+  </p:clrMapOvr>
+</p:notes>
+</file>
+
+<file path=ppt/notesSlides/notesSlide2.xml><?xml version="1.0" encoding="utf-8"?>
+<p:notes xmlns:a="http://schemas.openxmlformats.org/drawingml/2006/main" xmlns:r="http://schemas.openxmlformats.org/officeDocument/2006/relationships" xmlns:p="http://schemas.openxmlformats.org/presentationml/2006/main">
+  <p:cSld>
+    <p:spTree>
+      <p:nvGrpSpPr>
+        <p:cNvPr id="1" name=""/>
+        <p:cNvGrpSpPr/>
+        <p:nvPr/>
+      </p:nvGrpSpPr>
+      <p:grpSpPr>
+        <a:xfrm>
+          <a:off x="0" y="0"/>
+          <a:ext cx="0" cy="0"/>
+          <a:chOff x="0" y="0"/>
+          <a:chExt cx="0" cy="0"/>
+        </a:xfrm>
+      </p:grpSpPr>
+      <p:sp>
+        <p:nvSpPr>
+          <p:cNvPr id="2" name="Slide Image Placeholder 1"/>
+          <p:cNvSpPr>
+            <a:spLocks noGrp="1" noRot="1" noChangeAspect="1"/>
+          </p:cNvSpPr>
+          <p:nvPr>
+            <p:ph type="sldImg"/>
+          </p:nvPr>
+        </p:nvSpPr>
+        <p:spPr/>
+      </p:sp>
+      <p:sp>
+        <p:nvSpPr>
+          <p:cNvPr id="3" name="Notes Placeholder 2"/>
+          <p:cNvSpPr>
+            <a:spLocks noGrp="1"/>
+          </p:cNvSpPr>
+          <p:nvPr>
+            <p:ph type="body" idx="1"/>
+          </p:nvPr>
+        </p:nvSpPr>
+        <p:spPr/>
+        <p:txBody>
+          <a:bodyPr/>
+          <a:lstStyle/>
+          <a:p>
+            <a:endParaRPr lang="en-US" dirty="0"/>
+          </a:p>
+        </p:txBody>
+      </p:sp>
+      <p:sp>
+        <p:nvSpPr>
+          <p:cNvPr id="4" name="Slide Number Placeholder 3"/>
+          <p:cNvSpPr>
+            <a:spLocks noGrp="1"/>
+          </p:cNvSpPr>
+          <p:nvPr>
+            <p:ph type="sldNum" sz="quarter" idx="10"/>
+          </p:nvPr>
+        </p:nvSpPr>
+        <p:spPr/>
+        <p:txBody>
+          <a:bodyPr/>
+          <a:lstStyle/>
+          <a:p>
+            <a:fld id="{2F19F918-7AB5-42C2-AED8-408C377E077E}" type="slidenum">
+              <a:rPr lang="en-US" smtClean="0"/>
+              <a:t>5</a:t>
+            </a:fld>
+            <a:endParaRPr lang="en-US"/>
+          </a:p>
+        </p:txBody>
+      </p:sp>
+    </p:spTree>
+    <p:extLst>
+      <p:ext uri="{BB962C8B-B14F-4D97-AF65-F5344CB8AC3E}">
+        <p14:creationId xmlns:p14="http://schemas.microsoft.com/office/powerpoint/2010/main" val="2058468277"/>
+      </p:ext>
+    </p:extLst>
+  </p:cSld>
+  <p:clrMapOvr>
+    <a:masterClrMapping/>
+  </p:clrMapOvr>
+</p:notes>
 </file>
 
 <file path=ppt/slideLayouts/slideLayout1.xml><?xml version="1.0" encoding="utf-8"?>
@@ -273,7 +1925,7 @@
           <a:p>
             <a:fld id="{F4F99D56-E929-4165-804A-D5181D5DCEB5}" type="datetimeFigureOut">
               <a:rPr lang="en-US" smtClean="0"/>
-              <a:t>9/15/2014</a:t>
+              <a:t>16-Sep-14</a:t>
             </a:fld>
             <a:endParaRPr lang="en-US"/>
           </a:p>
@@ -461,7 +2113,7 @@
           <a:p>
             <a:fld id="{F4F99D56-E929-4165-804A-D5181D5DCEB5}" type="datetimeFigureOut">
               <a:rPr lang="en-US" smtClean="0"/>
-              <a:t>9/15/2014</a:t>
+              <a:t>16-Sep-14</a:t>
             </a:fld>
             <a:endParaRPr lang="en-US"/>
           </a:p>
@@ -657,7 +2309,7 @@
           <a:p>
             <a:fld id="{F4F99D56-E929-4165-804A-D5181D5DCEB5}" type="datetimeFigureOut">
               <a:rPr lang="en-US" smtClean="0"/>
-              <a:t>9/15/2014</a:t>
+              <a:t>16-Sep-14</a:t>
             </a:fld>
             <a:endParaRPr lang="en-US"/>
           </a:p>
@@ -845,7 +2497,7 @@
           <a:p>
             <a:fld id="{F4F99D56-E929-4165-804A-D5181D5DCEB5}" type="datetimeFigureOut">
               <a:rPr lang="en-US" smtClean="0"/>
-              <a:t>9/15/2014</a:t>
+              <a:t>16-Sep-14</a:t>
             </a:fld>
             <a:endParaRPr lang="en-US"/>
           </a:p>
@@ -1101,7 +2753,7 @@
           <a:p>
             <a:fld id="{F4F99D56-E929-4165-804A-D5181D5DCEB5}" type="datetimeFigureOut">
               <a:rPr lang="en-US" smtClean="0"/>
-              <a:t>9/15/2014</a:t>
+              <a:t>16-Sep-14</a:t>
             </a:fld>
             <a:endParaRPr lang="en-US"/>
           </a:p>
@@ -1351,7 +3003,7 @@
           <a:p>
             <a:fld id="{F4F99D56-E929-4165-804A-D5181D5DCEB5}" type="datetimeFigureOut">
               <a:rPr lang="en-US" smtClean="0"/>
-              <a:t>9/15/2014</a:t>
+              <a:t>16-Sep-14</a:t>
             </a:fld>
             <a:endParaRPr lang="en-US"/>
           </a:p>
@@ -1736,7 +3388,7 @@
           <a:p>
             <a:fld id="{F4F99D56-E929-4165-804A-D5181D5DCEB5}" type="datetimeFigureOut">
               <a:rPr lang="en-US" smtClean="0"/>
-              <a:t>9/15/2014</a:t>
+              <a:t>16-Sep-14</a:t>
             </a:fld>
             <a:endParaRPr lang="en-US"/>
           </a:p>
@@ -1872,7 +3524,7 @@
           <a:p>
             <a:fld id="{F4F99D56-E929-4165-804A-D5181D5DCEB5}" type="datetimeFigureOut">
               <a:rPr lang="en-US" smtClean="0"/>
-              <a:t>9/15/2014</a:t>
+              <a:t>16-Sep-14</a:t>
             </a:fld>
             <a:endParaRPr lang="en-US"/>
           </a:p>
@@ -1979,7 +3631,7 @@
           <a:p>
             <a:fld id="{F4F99D56-E929-4165-804A-D5181D5DCEB5}" type="datetimeFigureOut">
               <a:rPr lang="en-US" smtClean="0"/>
-              <a:t>9/15/2014</a:t>
+              <a:t>16-Sep-14</a:t>
             </a:fld>
             <a:endParaRPr lang="en-US"/>
           </a:p>
@@ -2268,7 +3920,7 @@
           <a:p>
             <a:fld id="{F4F99D56-E929-4165-804A-D5181D5DCEB5}" type="datetimeFigureOut">
               <a:rPr lang="en-US" smtClean="0"/>
-              <a:t>9/15/2014</a:t>
+              <a:t>16-Sep-14</a:t>
             </a:fld>
             <a:endParaRPr lang="en-US"/>
           </a:p>
@@ -2537,7 +4189,7 @@
           <a:p>
             <a:fld id="{F4F99D56-E929-4165-804A-D5181D5DCEB5}" type="datetimeFigureOut">
               <a:rPr lang="en-US" smtClean="0"/>
-              <a:t>9/15/2014</a:t>
+              <a:t>16-Sep-14</a:t>
             </a:fld>
             <a:endParaRPr lang="en-US"/>
           </a:p>
@@ -2792,7 +4444,7 @@
           <a:p>
             <a:fld id="{F4F99D56-E929-4165-804A-D5181D5DCEB5}" type="datetimeFigureOut">
               <a:rPr lang="en-US" smtClean="0"/>
-              <a:t>9/15/2014</a:t>
+              <a:t>16-Sep-14</a:t>
             </a:fld>
             <a:endParaRPr lang="en-US"/>
           </a:p>
@@ -4840,13 +6492,13 @@
   <p:clrMapOvr>
     <a:masterClrMapping/>
   </p:clrMapOvr>
-  <mc:AlternateContent xmlns:mc="http://schemas.openxmlformats.org/markup-compatibility/2006">
-    <mc:Choice xmlns:p14="http://schemas.microsoft.com/office/powerpoint/2010/main" Requires="p14">
+  <mc:AlternateContent xmlns:mc="http://schemas.openxmlformats.org/markup-compatibility/2006" xmlns:p14="http://schemas.microsoft.com/office/powerpoint/2010/main">
+    <mc:Choice Requires="p14">
       <p:transition spd="slow" p14:dur="1500">
         <p:push dir="u"/>
       </p:transition>
     </mc:Choice>
-    <mc:Fallback>
+    <mc:Fallback xmlns="">
       <p:transition spd="slow">
         <p:push dir="u"/>
       </p:transition>
@@ -5672,7 +7324,12 @@
             <p:ph type="title"/>
           </p:nvPr>
         </p:nvSpPr>
-        <p:spPr/>
+        <p:spPr>
+          <a:xfrm>
+            <a:off x="628650" y="261887"/>
+            <a:ext cx="7886700" cy="962229"/>
+          </a:xfrm>
+        </p:spPr>
         <p:txBody>
           <a:bodyPr/>
           <a:lstStyle/>
@@ -5725,8 +7382,8 @@
         </p:blipFill>
         <p:spPr>
           <a:xfrm>
-            <a:off x="2993133" y="1933222"/>
-            <a:ext cx="3157734" cy="4136144"/>
+            <a:off x="2330245" y="1064941"/>
+            <a:ext cx="4306529" cy="5640888"/>
           </a:xfrm>
         </p:spPr>
       </p:pic>
@@ -5740,13 +7397,13 @@
   <p:clrMapOvr>
     <a:masterClrMapping/>
   </p:clrMapOvr>
-  <mc:AlternateContent xmlns:mc="http://schemas.openxmlformats.org/markup-compatibility/2006">
-    <mc:Choice xmlns:p14="http://schemas.microsoft.com/office/powerpoint/2010/main" Requires="p14">
+  <mc:AlternateContent xmlns:mc="http://schemas.openxmlformats.org/markup-compatibility/2006" xmlns:p14="http://schemas.microsoft.com/office/powerpoint/2010/main">
+    <mc:Choice Requires="p14">
       <p:transition spd="slow" p14:dur="1500">
         <p:push dir="u"/>
       </p:transition>
     </mc:Choice>
-    <mc:Fallback>
+    <mc:Fallback xmlns="">
       <p:transition spd="slow">
         <p:push dir="u"/>
       </p:transition>
@@ -5841,18 +7498,25 @@
   <p:clrMapOvr>
     <a:masterClrMapping/>
   </p:clrMapOvr>
-  <mc:AlternateContent xmlns:mc="http://schemas.openxmlformats.org/markup-compatibility/2006">
-    <mc:Choice xmlns:p14="http://schemas.microsoft.com/office/powerpoint/2010/main" Requires="p14">
+  <mc:AlternateContent xmlns:mc="http://schemas.openxmlformats.org/markup-compatibility/2006" xmlns:p14="http://schemas.microsoft.com/office/powerpoint/2010/main">
+    <mc:Choice Requires="p14">
       <p:transition spd="slow" p14:dur="1500">
         <p:push dir="u"/>
       </p:transition>
     </mc:Choice>
-    <mc:Fallback>
+    <mc:Fallback xmlns="">
       <p:transition spd="slow">
         <p:push dir="u"/>
       </p:transition>
     </mc:Fallback>
   </mc:AlternateContent>
+  <p:timing>
+    <p:tnLst>
+      <p:par>
+        <p:cTn id="1" dur="indefinite" restart="never" nodeType="tmRoot"/>
+      </p:par>
+    </p:tnLst>
+  </p:timing>
 </p:sld>
 </file>
 
@@ -5975,18 +7639,25 @@
   <p:clrMapOvr>
     <a:masterClrMapping/>
   </p:clrMapOvr>
-  <mc:AlternateContent xmlns:mc="http://schemas.openxmlformats.org/markup-compatibility/2006">
-    <mc:Choice xmlns:p14="http://schemas.microsoft.com/office/powerpoint/2010/main" Requires="p14">
+  <mc:AlternateContent xmlns:mc="http://schemas.openxmlformats.org/markup-compatibility/2006" xmlns:p14="http://schemas.microsoft.com/office/powerpoint/2010/main">
+    <mc:Choice Requires="p14">
       <p:transition spd="slow" p14:dur="1500">
         <p:push dir="u"/>
       </p:transition>
     </mc:Choice>
-    <mc:Fallback>
+    <mc:Fallback xmlns="">
       <p:transition spd="slow">
         <p:push dir="u"/>
       </p:transition>
     </mc:Fallback>
   </mc:AlternateContent>
+  <p:timing>
+    <p:tnLst>
+      <p:par>
+        <p:cTn id="1" dur="indefinite" restart="never" nodeType="tmRoot"/>
+      </p:par>
+    </p:tnLst>
+  </p:timing>
 </p:sld>
 </file>
 
@@ -6067,18 +7738,25 @@
   <p:clrMapOvr>
     <a:masterClrMapping/>
   </p:clrMapOvr>
-  <mc:AlternateContent xmlns:mc="http://schemas.openxmlformats.org/markup-compatibility/2006">
-    <mc:Choice xmlns:p14="http://schemas.microsoft.com/office/powerpoint/2010/main" Requires="p14">
+  <mc:AlternateContent xmlns:mc="http://schemas.openxmlformats.org/markup-compatibility/2006" xmlns:p14="http://schemas.microsoft.com/office/powerpoint/2010/main">
+    <mc:Choice Requires="p14">
       <p:transition spd="slow" p14:dur="1500">
         <p:push dir="u"/>
       </p:transition>
     </mc:Choice>
-    <mc:Fallback>
+    <mc:Fallback xmlns="">
       <p:transition spd="slow">
         <p:push dir="u"/>
       </p:transition>
     </mc:Fallback>
   </mc:AlternateContent>
+  <p:timing>
+    <p:tnLst>
+      <p:par>
+        <p:cTn id="1" dur="indefinite" restart="never" nodeType="tmRoot"/>
+      </p:par>
+    </p:tnLst>
+  </p:timing>
 </p:sld>
 </file>
 
@@ -6159,18 +7837,25 @@
   <p:clrMapOvr>
     <a:masterClrMapping/>
   </p:clrMapOvr>
-  <mc:AlternateContent xmlns:mc="http://schemas.openxmlformats.org/markup-compatibility/2006">
-    <mc:Choice xmlns:p14="http://schemas.microsoft.com/office/powerpoint/2010/main" Requires="p14">
+  <mc:AlternateContent xmlns:mc="http://schemas.openxmlformats.org/markup-compatibility/2006" xmlns:p14="http://schemas.microsoft.com/office/powerpoint/2010/main">
+    <mc:Choice Requires="p14">
       <p:transition spd="slow" p14:dur="1500">
         <p:push dir="u"/>
       </p:transition>
     </mc:Choice>
-    <mc:Fallback>
+    <mc:Fallback xmlns="">
       <p:transition spd="slow">
         <p:push dir="u"/>
       </p:transition>
     </mc:Fallback>
   </mc:AlternateContent>
+  <p:timing>
+    <p:tnLst>
+      <p:par>
+        <p:cTn id="1" dur="indefinite" restart="never" nodeType="tmRoot"/>
+      </p:par>
+    </p:tnLst>
+  </p:timing>
 </p:sld>
 </file>
 
@@ -6208,17 +7893,17 @@
           <a:p>
             <a:r>
               <a:rPr lang="en-US" dirty="0" err="1" smtClean="0"/>
-              <a:t>Analisa</a:t>
+              <a:t>Analisis</a:t>
             </a:r>
             <a:r>
               <a:rPr lang="en-US" dirty="0" smtClean="0"/>
               <a:t> </a:t>
             </a:r>
             <a:r>
-              <a:rPr lang="en-US" smtClean="0"/>
+              <a:rPr lang="en-US" dirty="0" err="1" smtClean="0"/>
               <a:t>Algoritma</a:t>
             </a:r>
-            <a:endParaRPr lang="en-US"/>
+            <a:endParaRPr lang="en-US" dirty="0"/>
           </a:p>
         </p:txBody>
       </p:sp>
@@ -6251,18 +7936,25 @@
   <p:clrMapOvr>
     <a:masterClrMapping/>
   </p:clrMapOvr>
-  <mc:AlternateContent xmlns:mc="http://schemas.openxmlformats.org/markup-compatibility/2006">
-    <mc:Choice xmlns:p14="http://schemas.microsoft.com/office/powerpoint/2010/main" Requires="p14">
+  <mc:AlternateContent xmlns:mc="http://schemas.openxmlformats.org/markup-compatibility/2006" xmlns:p14="http://schemas.microsoft.com/office/powerpoint/2010/main">
+    <mc:Choice Requires="p14">
       <p:transition spd="slow" p14:dur="1500">
         <p:push dir="u"/>
       </p:transition>
     </mc:Choice>
-    <mc:Fallback>
+    <mc:Fallback xmlns="">
       <p:transition spd="slow">
         <p:push dir="u"/>
       </p:transition>
     </mc:Fallback>
   </mc:AlternateContent>
+  <p:timing>
+    <p:tnLst>
+      <p:par>
+        <p:cTn id="1" dur="indefinite" restart="never" nodeType="tmRoot"/>
+      </p:par>
+    </p:tnLst>
+  </p:timing>
 </p:sld>
 </file>
 
@@ -6623,8 +8315,293 @@
   <a:extraClrSchemeLst/>
   <a:extLst>
     <a:ext uri="{05A4C25C-085E-4340-85A3-A5531E510DB2}">
-      <thm15:themeFamily xmlns:thm15="http://schemas.microsoft.com/office/thememl/2012/main" name="Office Theme" id="{62F939B6-93AF-4DB8-9C6B-D6C7DFDC589F}" vid="{4A3C46E8-61CC-4603-A589-7422A47A8E4A}"/>
+      <thm15:themeFamily xmlns:thm15="http://schemas.microsoft.com/office/thememl/2012/main" xmlns="" name="Office Theme" id="{62F939B6-93AF-4DB8-9C6B-D6C7DFDC589F}" vid="{4A3C46E8-61CC-4603-A589-7422A47A8E4A}"/>
     </a:ext>
   </a:extLst>
 </a:theme>
+</file>
+
+<file path=ppt/theme/theme2.xml><?xml version="1.0" encoding="utf-8"?>
+<a:theme xmlns:a="http://schemas.openxmlformats.org/drawingml/2006/main" name="Office Theme">
+  <a:themeElements>
+    <a:clrScheme name="Office">
+      <a:dk1>
+        <a:sysClr val="windowText" lastClr="000000"/>
+      </a:dk1>
+      <a:lt1>
+        <a:sysClr val="window" lastClr="FFFFFF"/>
+      </a:lt1>
+      <a:dk2>
+        <a:srgbClr val="1F497D"/>
+      </a:dk2>
+      <a:lt2>
+        <a:srgbClr val="EEECE1"/>
+      </a:lt2>
+      <a:accent1>
+        <a:srgbClr val="4F81BD"/>
+      </a:accent1>
+      <a:accent2>
+        <a:srgbClr val="C0504D"/>
+      </a:accent2>
+      <a:accent3>
+        <a:srgbClr val="9BBB59"/>
+      </a:accent3>
+      <a:accent4>
+        <a:srgbClr val="8064A2"/>
+      </a:accent4>
+      <a:accent5>
+        <a:srgbClr val="4BACC6"/>
+      </a:accent5>
+      <a:accent6>
+        <a:srgbClr val="F79646"/>
+      </a:accent6>
+      <a:hlink>
+        <a:srgbClr val="0000FF"/>
+      </a:hlink>
+      <a:folHlink>
+        <a:srgbClr val="800080"/>
+      </a:folHlink>
+    </a:clrScheme>
+    <a:fontScheme name="Office">
+      <a:majorFont>
+        <a:latin typeface="Calibri"/>
+        <a:ea typeface=""/>
+        <a:cs typeface=""/>
+        <a:font script="Jpan" typeface="ＭＳ Ｐゴシック"/>
+        <a:font script="Hang" typeface="맑은 고딕"/>
+        <a:font script="Hans" typeface="宋体"/>
+        <a:font script="Hant" typeface="新細明體"/>
+        <a:font script="Arab" typeface="Times New Roman"/>
+        <a:font script="Hebr" typeface="Times New Roman"/>
+        <a:font script="Thai" typeface="Angsana New"/>
+        <a:font script="Ethi" typeface="Nyala"/>
+        <a:font script="Beng" typeface="Vrinda"/>
+        <a:font script="Gujr" typeface="Shruti"/>
+        <a:font script="Khmr" typeface="MoolBoran"/>
+        <a:font script="Knda" typeface="Tunga"/>
+        <a:font script="Guru" typeface="Raavi"/>
+        <a:font script="Cans" typeface="Euphemia"/>
+        <a:font script="Cher" typeface="Plantagenet Cherokee"/>
+        <a:font script="Yiii" typeface="Microsoft Yi Baiti"/>
+        <a:font script="Tibt" typeface="Microsoft Himalaya"/>
+        <a:font script="Thaa" typeface="MV Boli"/>
+        <a:font script="Deva" typeface="Mangal"/>
+        <a:font script="Telu" typeface="Gautami"/>
+        <a:font script="Taml" typeface="Latha"/>
+        <a:font script="Syrc" typeface="Estrangelo Edessa"/>
+        <a:font script="Orya" typeface="Kalinga"/>
+        <a:font script="Mlym" typeface="Kartika"/>
+        <a:font script="Laoo" typeface="DokChampa"/>
+        <a:font script="Sinh" typeface="Iskoola Pota"/>
+        <a:font script="Mong" typeface="Mongolian Baiti"/>
+        <a:font script="Viet" typeface="Times New Roman"/>
+        <a:font script="Uigh" typeface="Microsoft Uighur"/>
+        <a:font script="Geor" typeface="Sylfaen"/>
+      </a:majorFont>
+      <a:minorFont>
+        <a:latin typeface="Calibri"/>
+        <a:ea typeface=""/>
+        <a:cs typeface=""/>
+        <a:font script="Jpan" typeface="ＭＳ Ｐゴシック"/>
+        <a:font script="Hang" typeface="맑은 고딕"/>
+        <a:font script="Hans" typeface="宋体"/>
+        <a:font script="Hant" typeface="新細明體"/>
+        <a:font script="Arab" typeface="Arial"/>
+        <a:font script="Hebr" typeface="Arial"/>
+        <a:font script="Thai" typeface="Cordia New"/>
+        <a:font script="Ethi" typeface="Nyala"/>
+        <a:font script="Beng" typeface="Vrinda"/>
+        <a:font script="Gujr" typeface="Shruti"/>
+        <a:font script="Khmr" typeface="DaunPenh"/>
+        <a:font script="Knda" typeface="Tunga"/>
+        <a:font script="Guru" typeface="Raavi"/>
+        <a:font script="Cans" typeface="Euphemia"/>
+        <a:font script="Cher" typeface="Plantagenet Cherokee"/>
+        <a:font script="Yiii" typeface="Microsoft Yi Baiti"/>
+        <a:font script="Tibt" typeface="Microsoft Himalaya"/>
+        <a:font script="Thaa" typeface="MV Boli"/>
+        <a:font script="Deva" typeface="Mangal"/>
+        <a:font script="Telu" typeface="Gautami"/>
+        <a:font script="Taml" typeface="Latha"/>
+        <a:font script="Syrc" typeface="Estrangelo Edessa"/>
+        <a:font script="Orya" typeface="Kalinga"/>
+        <a:font script="Mlym" typeface="Kartika"/>
+        <a:font script="Laoo" typeface="DokChampa"/>
+        <a:font script="Sinh" typeface="Iskoola Pota"/>
+        <a:font script="Mong" typeface="Mongolian Baiti"/>
+        <a:font script="Viet" typeface="Arial"/>
+        <a:font script="Uigh" typeface="Microsoft Uighur"/>
+        <a:font script="Geor" typeface="Sylfaen"/>
+      </a:minorFont>
+    </a:fontScheme>
+    <a:fmtScheme name="Office">
+      <a:fillStyleLst>
+        <a:solidFill>
+          <a:schemeClr val="phClr"/>
+        </a:solidFill>
+        <a:gradFill rotWithShape="1">
+          <a:gsLst>
+            <a:gs pos="0">
+              <a:schemeClr val="phClr">
+                <a:tint val="50000"/>
+                <a:satMod val="300000"/>
+              </a:schemeClr>
+            </a:gs>
+            <a:gs pos="35000">
+              <a:schemeClr val="phClr">
+                <a:tint val="37000"/>
+                <a:satMod val="300000"/>
+              </a:schemeClr>
+            </a:gs>
+            <a:gs pos="100000">
+              <a:schemeClr val="phClr">
+                <a:tint val="15000"/>
+                <a:satMod val="350000"/>
+              </a:schemeClr>
+            </a:gs>
+          </a:gsLst>
+          <a:lin ang="16200000" scaled="1"/>
+        </a:gradFill>
+        <a:gradFill rotWithShape="1">
+          <a:gsLst>
+            <a:gs pos="0">
+              <a:schemeClr val="phClr">
+                <a:shade val="51000"/>
+                <a:satMod val="130000"/>
+              </a:schemeClr>
+            </a:gs>
+            <a:gs pos="80000">
+              <a:schemeClr val="phClr">
+                <a:shade val="93000"/>
+                <a:satMod val="130000"/>
+              </a:schemeClr>
+            </a:gs>
+            <a:gs pos="100000">
+              <a:schemeClr val="phClr">
+                <a:shade val="94000"/>
+                <a:satMod val="135000"/>
+              </a:schemeClr>
+            </a:gs>
+          </a:gsLst>
+          <a:lin ang="16200000" scaled="0"/>
+        </a:gradFill>
+      </a:fillStyleLst>
+      <a:lnStyleLst>
+        <a:ln w="9525" cap="flat" cmpd="sng" algn="ctr">
+          <a:solidFill>
+            <a:schemeClr val="phClr">
+              <a:shade val="95000"/>
+              <a:satMod val="105000"/>
+            </a:schemeClr>
+          </a:solidFill>
+          <a:prstDash val="solid"/>
+        </a:ln>
+        <a:ln w="25400" cap="flat" cmpd="sng" algn="ctr">
+          <a:solidFill>
+            <a:schemeClr val="phClr"/>
+          </a:solidFill>
+          <a:prstDash val="solid"/>
+        </a:ln>
+        <a:ln w="38100" cap="flat" cmpd="sng" algn="ctr">
+          <a:solidFill>
+            <a:schemeClr val="phClr"/>
+          </a:solidFill>
+          <a:prstDash val="solid"/>
+        </a:ln>
+      </a:lnStyleLst>
+      <a:effectStyleLst>
+        <a:effectStyle>
+          <a:effectLst>
+            <a:outerShdw blurRad="40000" dist="20000" dir="5400000" rotWithShape="0">
+              <a:srgbClr val="000000">
+                <a:alpha val="38000"/>
+              </a:srgbClr>
+            </a:outerShdw>
+          </a:effectLst>
+        </a:effectStyle>
+        <a:effectStyle>
+          <a:effectLst>
+            <a:outerShdw blurRad="40000" dist="23000" dir="5400000" rotWithShape="0">
+              <a:srgbClr val="000000">
+                <a:alpha val="35000"/>
+              </a:srgbClr>
+            </a:outerShdw>
+          </a:effectLst>
+        </a:effectStyle>
+        <a:effectStyle>
+          <a:effectLst>
+            <a:outerShdw blurRad="40000" dist="23000" dir="5400000" rotWithShape="0">
+              <a:srgbClr val="000000">
+                <a:alpha val="35000"/>
+              </a:srgbClr>
+            </a:outerShdw>
+          </a:effectLst>
+          <a:scene3d>
+            <a:camera prst="orthographicFront">
+              <a:rot lat="0" lon="0" rev="0"/>
+            </a:camera>
+            <a:lightRig rig="threePt" dir="t">
+              <a:rot lat="0" lon="0" rev="1200000"/>
+            </a:lightRig>
+          </a:scene3d>
+          <a:sp3d>
+            <a:bevelT w="63500" h="25400"/>
+          </a:sp3d>
+        </a:effectStyle>
+      </a:effectStyleLst>
+      <a:bgFillStyleLst>
+        <a:solidFill>
+          <a:schemeClr val="phClr"/>
+        </a:solidFill>
+        <a:gradFill rotWithShape="1">
+          <a:gsLst>
+            <a:gs pos="0">
+              <a:schemeClr val="phClr">
+                <a:tint val="40000"/>
+                <a:satMod val="350000"/>
+              </a:schemeClr>
+            </a:gs>
+            <a:gs pos="40000">
+              <a:schemeClr val="phClr">
+                <a:tint val="45000"/>
+                <a:shade val="99000"/>
+                <a:satMod val="350000"/>
+              </a:schemeClr>
+            </a:gs>
+            <a:gs pos="100000">
+              <a:schemeClr val="phClr">
+                <a:shade val="20000"/>
+                <a:satMod val="255000"/>
+              </a:schemeClr>
+            </a:gs>
+          </a:gsLst>
+          <a:path path="circle">
+            <a:fillToRect l="50000" t="-80000" r="50000" b="180000"/>
+          </a:path>
+        </a:gradFill>
+        <a:gradFill rotWithShape="1">
+          <a:gsLst>
+            <a:gs pos="0">
+              <a:schemeClr val="phClr">
+                <a:tint val="80000"/>
+                <a:satMod val="300000"/>
+              </a:schemeClr>
+            </a:gs>
+            <a:gs pos="100000">
+              <a:schemeClr val="phClr">
+                <a:shade val="30000"/>
+                <a:satMod val="200000"/>
+              </a:schemeClr>
+            </a:gs>
+          </a:gsLst>
+          <a:path path="circle">
+            <a:fillToRect l="50000" t="50000" r="50000" b="50000"/>
+          </a:path>
+        </a:gradFill>
+      </a:bgFillStyleLst>
+    </a:fmtScheme>
+  </a:themeElements>
+  <a:objectDefaults/>
+  <a:extraClrSchemeLst/>
+</a:theme>
 </file>
</xml_diff>